<commit_message>
adding content to ppt and logit.jl
</commit_message>
<xml_diff>
--- a/Homework 1/hw1-pre.pptx
+++ b/Homework 1/hw1-pre.pptx
@@ -8,11 +8,12 @@
     <p:sldId id="256" r:id="rId2"/>
     <p:sldId id="257" r:id="rId3"/>
     <p:sldId id="260" r:id="rId4"/>
-    <p:sldId id="261" r:id="rId5"/>
-    <p:sldId id="262" r:id="rId6"/>
-    <p:sldId id="258" r:id="rId7"/>
-    <p:sldId id="263" r:id="rId8"/>
-    <p:sldId id="264" r:id="rId9"/>
+    <p:sldId id="265" r:id="rId5"/>
+    <p:sldId id="261" r:id="rId6"/>
+    <p:sldId id="262" r:id="rId7"/>
+    <p:sldId id="258" r:id="rId8"/>
+    <p:sldId id="263" r:id="rId9"/>
+    <p:sldId id="264" r:id="rId10"/>
   </p:sldIdLst>
   <p:sldSz cx="12192000" cy="6858000"/>
   <p:notesSz cx="6858000" cy="9144000"/>
@@ -111,6 +112,11 @@
       </a:defRPr>
     </a:lvl9pPr>
   </p:defaultTextStyle>
+  <p:extLst>
+    <p:ext uri="{EFAFB233-063F-42B5-8137-9DF3F51BA10A}">
+      <p15:sldGuideLst xmlns:p15="http://schemas.microsoft.com/office/powerpoint/2012/main"/>
+    </p:ext>
+  </p:extLst>
 </p:presentation>
 </file>
 
@@ -1524,7 +1530,7 @@
             <a:fld id="{48A87A34-81AB-432B-8DAE-1953F412C126}" type="datetimeFigureOut">
               <a:rPr lang="en-US" dirty="0"/>
               <a:pPr/>
-              <a:t>10/29/20</a:t>
+              <a:t>10/30/20</a:t>
             </a:fld>
             <a:endParaRPr lang="en-US" dirty="0"/>
           </a:p>
@@ -2978,7 +2984,7 @@
           <a:p>
             <a:fld id="{48A87A34-81AB-432B-8DAE-1953F412C126}" type="datetimeFigureOut">
               <a:rPr lang="en-US" dirty="0"/>
-              <a:t>10/29/20</a:t>
+              <a:t>10/30/20</a:t>
             </a:fld>
             <a:endParaRPr lang="en-US" dirty="0"/>
           </a:p>
@@ -4426,7 +4432,7 @@
           <a:p>
             <a:fld id="{48A87A34-81AB-432B-8DAE-1953F412C126}" type="datetimeFigureOut">
               <a:rPr lang="en-US" dirty="0"/>
-              <a:t>10/29/20</a:t>
+              <a:t>10/30/20</a:t>
             </a:fld>
             <a:endParaRPr lang="en-US" dirty="0"/>
           </a:p>
@@ -5876,7 +5882,7 @@
           <a:p>
             <a:fld id="{48A87A34-81AB-432B-8DAE-1953F412C126}" type="datetimeFigureOut">
               <a:rPr lang="en-US" dirty="0"/>
-              <a:t>10/29/20</a:t>
+              <a:t>10/30/20</a:t>
             </a:fld>
             <a:endParaRPr lang="en-US" dirty="0"/>
           </a:p>
@@ -7379,7 +7385,7 @@
           <a:p>
             <a:fld id="{48A87A34-81AB-432B-8DAE-1953F412C126}" type="datetimeFigureOut">
               <a:rPr lang="en-US" dirty="0"/>
-              <a:t>10/29/20</a:t>
+              <a:t>10/30/20</a:t>
             </a:fld>
             <a:endParaRPr lang="en-US" dirty="0"/>
           </a:p>
@@ -8895,7 +8901,7 @@
           <a:p>
             <a:fld id="{48A87A34-81AB-432B-8DAE-1953F412C126}" type="datetimeFigureOut">
               <a:rPr lang="en-US" dirty="0"/>
-              <a:t>10/29/20</a:t>
+              <a:t>10/30/20</a:t>
             </a:fld>
             <a:endParaRPr lang="en-US" dirty="0"/>
           </a:p>
@@ -10555,7 +10561,7 @@
           <a:p>
             <a:fld id="{48A87A34-81AB-432B-8DAE-1953F412C126}" type="datetimeFigureOut">
               <a:rPr lang="en-US" dirty="0"/>
-              <a:t>10/29/20</a:t>
+              <a:t>10/30/20</a:t>
             </a:fld>
             <a:endParaRPr lang="en-US" dirty="0"/>
           </a:p>
@@ -11948,7 +11954,7 @@
           <a:p>
             <a:fld id="{48A87A34-81AB-432B-8DAE-1953F412C126}" type="datetimeFigureOut">
               <a:rPr lang="en-US" dirty="0"/>
-              <a:t>10/29/20</a:t>
+              <a:t>10/30/20</a:t>
             </a:fld>
             <a:endParaRPr lang="en-US" dirty="0"/>
           </a:p>
@@ -12043,7 +12049,7 @@
           <a:p>
             <a:fld id="{48A87A34-81AB-432B-8DAE-1953F412C126}" type="datetimeFigureOut">
               <a:rPr lang="en-US" dirty="0"/>
-              <a:t>10/29/20</a:t>
+              <a:t>10/30/20</a:t>
             </a:fld>
             <a:endParaRPr lang="en-US" dirty="0"/>
           </a:p>
@@ -13564,7 +13570,7 @@
           <a:p>
             <a:fld id="{48A87A34-81AB-432B-8DAE-1953F412C126}" type="datetimeFigureOut">
               <a:rPr lang="en-US" dirty="0"/>
-              <a:t>10/29/20</a:t>
+              <a:t>10/30/20</a:t>
             </a:fld>
             <a:endParaRPr lang="en-US" dirty="0"/>
           </a:p>
@@ -15095,7 +15101,7 @@
           <a:p>
             <a:fld id="{48A87A34-81AB-432B-8DAE-1953F412C126}" type="datetimeFigureOut">
               <a:rPr lang="en-US" dirty="0"/>
-              <a:t>10/29/20</a:t>
+              <a:t>10/30/20</a:t>
             </a:fld>
             <a:endParaRPr lang="en-US" dirty="0"/>
           </a:p>
@@ -15314,7 +15320,7 @@
             <a:fld id="{48A87A34-81AB-432B-8DAE-1953F412C126}" type="datetimeFigureOut">
               <a:rPr lang="en-US" dirty="0"/>
               <a:pPr/>
-              <a:t>10/29/20</a:t>
+              <a:t>10/30/20</a:t>
             </a:fld>
             <a:endParaRPr lang="en-US" dirty="0"/>
           </a:p>
@@ -16110,7 +16116,18 @@
           <a:bodyPr/>
           <a:lstStyle/>
           <a:p>
-            <a:endParaRPr lang="en-US"/>
+            <a:r>
+              <a:rPr lang="en-US" dirty="0"/>
+              <a:t>The average accuracy (</a:t>
+            </a:r>
+            <a:r>
+              <a:rPr lang="en-US"/>
+              <a:t>10000 predictions) </a:t>
+            </a:r>
+            <a:r>
+              <a:rPr lang="en-US" dirty="0"/>
+              <a:t>of the logistic regression model in the Julia implementation is 70%</a:t>
+            </a:r>
           </a:p>
         </p:txBody>
       </p:sp>
@@ -16178,7 +16195,7 @@
             </a:r>
             <a:r>
               <a:rPr lang="en-US" dirty="0"/>
-              <a:t> Space)</a:t>
+              <a:t> Accuracy)</a:t>
             </a:r>
           </a:p>
         </p:txBody>
@@ -16197,6 +16214,2340 @@
 </file>
 
 <file path=ppt/slides/slide4.xml><?xml version="1.0" encoding="utf-8"?>
+<p:sld xmlns:a="http://schemas.openxmlformats.org/drawingml/2006/main" xmlns:r="http://schemas.openxmlformats.org/officeDocument/2006/relationships" xmlns:p="http://schemas.openxmlformats.org/presentationml/2006/main">
+  <p:cSld>
+    <p:bg>
+      <p:bgPr>
+        <a:solidFill>
+          <a:schemeClr val="bg1"/>
+        </a:solidFill>
+        <a:effectLst/>
+      </p:bgPr>
+    </p:bg>
+    <p:spTree>
+      <p:nvGrpSpPr>
+        <p:cNvPr id="1" name=""/>
+        <p:cNvGrpSpPr/>
+        <p:nvPr/>
+      </p:nvGrpSpPr>
+      <p:grpSpPr>
+        <a:xfrm>
+          <a:off x="0" y="0"/>
+          <a:ext cx="0" cy="0"/>
+          <a:chOff x="0" y="0"/>
+          <a:chExt cx="0" cy="0"/>
+        </a:xfrm>
+      </p:grpSpPr>
+      <p:sp useBgFill="1">
+        <p:nvSpPr>
+          <p:cNvPr id="67" name="Rectangle 38">
+            <a:extLst>
+              <a:ext uri="{FF2B5EF4-FFF2-40B4-BE49-F238E27FC236}">
+                <a16:creationId xmlns:a16="http://schemas.microsoft.com/office/drawing/2014/main" id="{828D1E49-2A21-4A83-A0E0-FB1597B4B2ED}"/>
+              </a:ext>
+              <a:ext uri="{C183D7F6-B498-43B3-948B-1728B52AA6E4}">
+                <adec:decorative xmlns:adec="http://schemas.microsoft.com/office/drawing/2017/decorative" val="1"/>
+              </a:ext>
+            </a:extLst>
+          </p:cNvPr>
+          <p:cNvSpPr>
+            <a:spLocks noGrp="1" noRot="1" noChangeAspect="1" noMove="1" noResize="1" noEditPoints="1" noAdjustHandles="1" noChangeArrowheads="1" noChangeShapeType="1" noTextEdit="1"/>
+          </p:cNvSpPr>
+          <p:nvPr>
+            <p:extLst>
+              <p:ext uri="{386F3935-93C4-4BCD-93E2-E3B085C9AB24}">
+                <p16:designElem xmlns:p16="http://schemas.microsoft.com/office/powerpoint/2015/main" val="1"/>
+              </p:ext>
+            </p:extLst>
+          </p:nvPr>
+        </p:nvSpPr>
+        <p:spPr>
+          <a:xfrm>
+            <a:off x="0" y="0"/>
+            <a:ext cx="12191695" cy="6858000"/>
+          </a:xfrm>
+          <a:prstGeom prst="rect">
+            <a:avLst/>
+          </a:prstGeom>
+          <a:ln>
+            <a:noFill/>
+          </a:ln>
+        </p:spPr>
+        <p:style>
+          <a:lnRef idx="2">
+            <a:schemeClr val="accent1">
+              <a:shade val="50000"/>
+            </a:schemeClr>
+          </a:lnRef>
+          <a:fillRef idx="1">
+            <a:schemeClr val="accent1"/>
+          </a:fillRef>
+          <a:effectRef idx="0">
+            <a:schemeClr val="accent1"/>
+          </a:effectRef>
+          <a:fontRef idx="minor">
+            <a:schemeClr val="lt1"/>
+          </a:fontRef>
+        </p:style>
+        <p:txBody>
+          <a:bodyPr rtlCol="0" anchor="ctr"/>
+          <a:lstStyle/>
+          <a:p>
+            <a:pPr algn="ctr"/>
+            <a:endParaRPr lang="en-US"/>
+          </a:p>
+        </p:txBody>
+      </p:sp>
+      <p:grpSp>
+        <p:nvGrpSpPr>
+          <p:cNvPr id="90" name="Group 40">
+            <a:extLst>
+              <a:ext uri="{FF2B5EF4-FFF2-40B4-BE49-F238E27FC236}">
+                <a16:creationId xmlns:a16="http://schemas.microsoft.com/office/drawing/2014/main" id="{088B852E-5494-418B-A833-75CF016A9E20}"/>
+              </a:ext>
+              <a:ext uri="{C183D7F6-B498-43B3-948B-1728B52AA6E4}">
+                <adec:decorative xmlns:adec="http://schemas.microsoft.com/office/drawing/2017/decorative" val="1"/>
+              </a:ext>
+            </a:extLst>
+          </p:cNvPr>
+          <p:cNvGrpSpPr>
+            <a:grpSpLocks noGrp="1" noUngrp="1" noRot="1" noChangeAspect="1" noMove="1" noResize="1"/>
+          </p:cNvGrpSpPr>
+          <p:nvPr>
+            <p:extLst>
+              <p:ext uri="{386F3935-93C4-4BCD-93E2-E3B085C9AB24}">
+                <p16:designElem xmlns:p16="http://schemas.microsoft.com/office/powerpoint/2015/main" val="1"/>
+              </p:ext>
+            </p:extLst>
+          </p:nvPr>
+        </p:nvGrpSpPr>
+        <p:grpSpPr>
+          <a:xfrm>
+            <a:off x="-417513" y="0"/>
+            <a:ext cx="12584114" cy="6853238"/>
+            <a:chOff x="-417513" y="0"/>
+            <a:chExt cx="12584114" cy="6853238"/>
+          </a:xfrm>
+        </p:grpSpPr>
+        <p:sp>
+          <p:nvSpPr>
+            <p:cNvPr id="91" name="Freeform 5">
+              <a:extLst>
+                <a:ext uri="{FF2B5EF4-FFF2-40B4-BE49-F238E27FC236}">
+                  <a16:creationId xmlns:a16="http://schemas.microsoft.com/office/drawing/2014/main" id="{DF31E3C1-1A46-4329-9F80-B576692FEE43}"/>
+                </a:ext>
+                <a:ext uri="{C183D7F6-B498-43B3-948B-1728B52AA6E4}">
+                  <adec:decorative xmlns:adec="http://schemas.microsoft.com/office/drawing/2017/decorative" val="1"/>
+                </a:ext>
+              </a:extLst>
+            </p:cNvPr>
+            <p:cNvSpPr>
+              <a:spLocks/>
+            </p:cNvSpPr>
+            <p:nvPr>
+              <p:extLst>
+                <p:ext uri="{386F3935-93C4-4BCD-93E2-E3B085C9AB24}">
+                  <p16:designElem xmlns:p16="http://schemas.microsoft.com/office/powerpoint/2015/main" val="1"/>
+                </p:ext>
+              </p:extLst>
+            </p:nvPr>
+          </p:nvSpPr>
+          <p:spPr bwMode="auto">
+            <a:xfrm>
+              <a:off x="1306513" y="0"/>
+              <a:ext cx="3862388" cy="6843713"/>
+            </a:xfrm>
+            <a:custGeom>
+              <a:avLst/>
+              <a:gdLst>
+                <a:gd name="T0" fmla="*/ 813 w 813"/>
+                <a:gd name="T1" fmla="*/ 0 h 1440"/>
+                <a:gd name="T2" fmla="*/ 435 w 813"/>
+                <a:gd name="T3" fmla="*/ 1440 h 1440"/>
+              </a:gdLst>
+              <a:ahLst/>
+              <a:cxnLst>
+                <a:cxn ang="0">
+                  <a:pos x="T0" y="T1"/>
+                </a:cxn>
+                <a:cxn ang="0">
+                  <a:pos x="T2" y="T3"/>
+                </a:cxn>
+              </a:cxnLst>
+              <a:rect l="0" t="0" r="r" b="b"/>
+              <a:pathLst>
+                <a:path w="813" h="1440">
+                  <a:moveTo>
+                    <a:pt x="813" y="0"/>
+                  </a:moveTo>
+                  <a:cubicBezTo>
+                    <a:pt x="331" y="221"/>
+                    <a:pt x="0" y="1039"/>
+                    <a:pt x="435" y="1440"/>
+                  </a:cubicBezTo>
+                </a:path>
+              </a:pathLst>
+            </a:custGeom>
+            <a:noFill/>
+            <a:ln w="9525" cap="flat">
+              <a:solidFill>
+                <a:schemeClr val="tx1">
+                  <a:alpha val="10000"/>
+                </a:schemeClr>
+              </a:solidFill>
+              <a:prstDash val="solid"/>
+              <a:miter lim="800000"/>
+              <a:headEnd/>
+              <a:tailEnd/>
+            </a:ln>
+            <a:extLst>
+              <a:ext uri="{909E8E84-426E-40DD-AFC4-6F175D3DCCD1}">
+                <a14:hiddenFill xmlns:a14="http://schemas.microsoft.com/office/drawing/2010/main">
+                  <a:solidFill>
+                    <a:srgbClr val="FFFFFF"/>
+                  </a:solidFill>
+                </a14:hiddenFill>
+              </a:ext>
+            </a:extLst>
+          </p:spPr>
+          <p:txBody>
+            <a:bodyPr vert="horz" wrap="square" lIns="91440" tIns="45720" rIns="91440" bIns="45720" numCol="1" anchor="t" anchorCtr="0" compatLnSpc="1">
+              <a:prstTxWarp prst="textNoShape">
+                <a:avLst/>
+              </a:prstTxWarp>
+            </a:bodyPr>
+            <a:lstStyle/>
+            <a:p>
+              <a:endParaRPr lang="en-US"/>
+            </a:p>
+          </p:txBody>
+        </p:sp>
+        <p:sp>
+          <p:nvSpPr>
+            <p:cNvPr id="92" name="Freeform 6">
+              <a:extLst>
+                <a:ext uri="{FF2B5EF4-FFF2-40B4-BE49-F238E27FC236}">
+                  <a16:creationId xmlns:a16="http://schemas.microsoft.com/office/drawing/2014/main" id="{294B4592-99CA-47B1-816F-CE2D44F65BB2}"/>
+                </a:ext>
+                <a:ext uri="{C183D7F6-B498-43B3-948B-1728B52AA6E4}">
+                  <adec:decorative xmlns:adec="http://schemas.microsoft.com/office/drawing/2017/decorative" val="1"/>
+                </a:ext>
+              </a:extLst>
+            </p:cNvPr>
+            <p:cNvSpPr>
+              <a:spLocks/>
+            </p:cNvSpPr>
+            <p:nvPr>
+              <p:extLst>
+                <p:ext uri="{386F3935-93C4-4BCD-93E2-E3B085C9AB24}">
+                  <p16:designElem xmlns:p16="http://schemas.microsoft.com/office/powerpoint/2015/main" val="1"/>
+                </p:ext>
+              </p:extLst>
+            </p:nvPr>
+          </p:nvSpPr>
+          <p:spPr bwMode="auto">
+            <a:xfrm>
+              <a:off x="10626725" y="9525"/>
+              <a:ext cx="1539875" cy="555625"/>
+            </a:xfrm>
+            <a:custGeom>
+              <a:avLst/>
+              <a:gdLst>
+                <a:gd name="T0" fmla="*/ 324 w 324"/>
+                <a:gd name="T1" fmla="*/ 117 h 117"/>
+                <a:gd name="T2" fmla="*/ 0 w 324"/>
+                <a:gd name="T3" fmla="*/ 0 h 117"/>
+              </a:gdLst>
+              <a:ahLst/>
+              <a:cxnLst>
+                <a:cxn ang="0">
+                  <a:pos x="T0" y="T1"/>
+                </a:cxn>
+                <a:cxn ang="0">
+                  <a:pos x="T2" y="T3"/>
+                </a:cxn>
+              </a:cxnLst>
+              <a:rect l="0" t="0" r="r" b="b"/>
+              <a:pathLst>
+                <a:path w="324" h="117">
+                  <a:moveTo>
+                    <a:pt x="324" y="117"/>
+                  </a:moveTo>
+                  <a:cubicBezTo>
+                    <a:pt x="223" y="64"/>
+                    <a:pt x="107" y="28"/>
+                    <a:pt x="0" y="0"/>
+                  </a:cubicBezTo>
+                </a:path>
+              </a:pathLst>
+            </a:custGeom>
+            <a:noFill/>
+            <a:ln w="9525" cap="flat">
+              <a:solidFill>
+                <a:schemeClr val="tx1">
+                  <a:alpha val="10000"/>
+                </a:schemeClr>
+              </a:solidFill>
+              <a:prstDash val="solid"/>
+              <a:miter lim="800000"/>
+              <a:headEnd/>
+              <a:tailEnd/>
+            </a:ln>
+            <a:extLst>
+              <a:ext uri="{909E8E84-426E-40DD-AFC4-6F175D3DCCD1}">
+                <a14:hiddenFill xmlns:a14="http://schemas.microsoft.com/office/drawing/2010/main">
+                  <a:solidFill>
+                    <a:srgbClr val="FFFFFF"/>
+                  </a:solidFill>
+                </a14:hiddenFill>
+              </a:ext>
+            </a:extLst>
+          </p:spPr>
+          <p:txBody>
+            <a:bodyPr vert="horz" wrap="square" lIns="91440" tIns="45720" rIns="91440" bIns="45720" numCol="1" anchor="t" anchorCtr="0" compatLnSpc="1">
+              <a:prstTxWarp prst="textNoShape">
+                <a:avLst/>
+              </a:prstTxWarp>
+            </a:bodyPr>
+            <a:lstStyle/>
+            <a:p>
+              <a:endParaRPr lang="en-US"/>
+            </a:p>
+          </p:txBody>
+        </p:sp>
+        <p:sp>
+          <p:nvSpPr>
+            <p:cNvPr id="93" name="Freeform 7">
+              <a:extLst>
+                <a:ext uri="{FF2B5EF4-FFF2-40B4-BE49-F238E27FC236}">
+                  <a16:creationId xmlns:a16="http://schemas.microsoft.com/office/drawing/2014/main" id="{BF690E4C-72F8-4AC5-AF99-562763CC67B3}"/>
+                </a:ext>
+                <a:ext uri="{C183D7F6-B498-43B3-948B-1728B52AA6E4}">
+                  <adec:decorative xmlns:adec="http://schemas.microsoft.com/office/drawing/2017/decorative" val="1"/>
+                </a:ext>
+              </a:extLst>
+            </p:cNvPr>
+            <p:cNvSpPr>
+              <a:spLocks/>
+            </p:cNvSpPr>
+            <p:nvPr>
+              <p:extLst>
+                <p:ext uri="{386F3935-93C4-4BCD-93E2-E3B085C9AB24}">
+                  <p16:designElem xmlns:p16="http://schemas.microsoft.com/office/powerpoint/2015/main" val="1"/>
+                </p:ext>
+              </p:extLst>
+            </p:nvPr>
+          </p:nvSpPr>
+          <p:spPr bwMode="auto">
+            <a:xfrm>
+              <a:off x="10247313" y="5013325"/>
+              <a:ext cx="1919288" cy="1830388"/>
+            </a:xfrm>
+            <a:custGeom>
+              <a:avLst/>
+              <a:gdLst>
+                <a:gd name="T0" fmla="*/ 0 w 404"/>
+                <a:gd name="T1" fmla="*/ 385 h 385"/>
+                <a:gd name="T2" fmla="*/ 404 w 404"/>
+                <a:gd name="T3" fmla="*/ 0 h 385"/>
+              </a:gdLst>
+              <a:ahLst/>
+              <a:cxnLst>
+                <a:cxn ang="0">
+                  <a:pos x="T0" y="T1"/>
+                </a:cxn>
+                <a:cxn ang="0">
+                  <a:pos x="T2" y="T3"/>
+                </a:cxn>
+              </a:cxnLst>
+              <a:rect l="0" t="0" r="r" b="b"/>
+              <a:pathLst>
+                <a:path w="404" h="385">
+                  <a:moveTo>
+                    <a:pt x="0" y="385"/>
+                  </a:moveTo>
+                  <a:cubicBezTo>
+                    <a:pt x="146" y="272"/>
+                    <a:pt x="285" y="142"/>
+                    <a:pt x="404" y="0"/>
+                  </a:cubicBezTo>
+                </a:path>
+              </a:pathLst>
+            </a:custGeom>
+            <a:noFill/>
+            <a:ln w="9525" cap="flat">
+              <a:solidFill>
+                <a:schemeClr val="tx1">
+                  <a:alpha val="10000"/>
+                </a:schemeClr>
+              </a:solidFill>
+              <a:prstDash val="solid"/>
+              <a:miter lim="800000"/>
+              <a:headEnd/>
+              <a:tailEnd/>
+            </a:ln>
+            <a:extLst>
+              <a:ext uri="{909E8E84-426E-40DD-AFC4-6F175D3DCCD1}">
+                <a14:hiddenFill xmlns:a14="http://schemas.microsoft.com/office/drawing/2010/main">
+                  <a:solidFill>
+                    <a:srgbClr val="FFFFFF"/>
+                  </a:solidFill>
+                </a14:hiddenFill>
+              </a:ext>
+            </a:extLst>
+          </p:spPr>
+          <p:txBody>
+            <a:bodyPr vert="horz" wrap="square" lIns="91440" tIns="45720" rIns="91440" bIns="45720" numCol="1" anchor="t" anchorCtr="0" compatLnSpc="1">
+              <a:prstTxWarp prst="textNoShape">
+                <a:avLst/>
+              </a:prstTxWarp>
+            </a:bodyPr>
+            <a:lstStyle/>
+            <a:p>
+              <a:endParaRPr lang="en-US"/>
+            </a:p>
+          </p:txBody>
+        </p:sp>
+        <p:sp>
+          <p:nvSpPr>
+            <p:cNvPr id="94" name="Freeform 8">
+              <a:extLst>
+                <a:ext uri="{FF2B5EF4-FFF2-40B4-BE49-F238E27FC236}">
+                  <a16:creationId xmlns:a16="http://schemas.microsoft.com/office/drawing/2014/main" id="{F834CDD4-CAB8-4ACC-9AAC-5399C743DEC1}"/>
+                </a:ext>
+                <a:ext uri="{C183D7F6-B498-43B3-948B-1728B52AA6E4}">
+                  <adec:decorative xmlns:adec="http://schemas.microsoft.com/office/drawing/2017/decorative" val="1"/>
+                </a:ext>
+              </a:extLst>
+            </p:cNvPr>
+            <p:cNvSpPr>
+              <a:spLocks/>
+            </p:cNvSpPr>
+            <p:nvPr>
+              <p:extLst>
+                <p:ext uri="{386F3935-93C4-4BCD-93E2-E3B085C9AB24}">
+                  <p16:designElem xmlns:p16="http://schemas.microsoft.com/office/powerpoint/2015/main" val="1"/>
+                </p:ext>
+              </p:extLst>
+            </p:nvPr>
+          </p:nvSpPr>
+          <p:spPr bwMode="auto">
+            <a:xfrm>
+              <a:off x="1120775" y="0"/>
+              <a:ext cx="3676650" cy="6843713"/>
+            </a:xfrm>
+            <a:custGeom>
+              <a:avLst/>
+              <a:gdLst>
+                <a:gd name="T0" fmla="*/ 774 w 774"/>
+                <a:gd name="T1" fmla="*/ 0 h 1440"/>
+                <a:gd name="T2" fmla="*/ 411 w 774"/>
+                <a:gd name="T3" fmla="*/ 1440 h 1440"/>
+              </a:gdLst>
+              <a:ahLst/>
+              <a:cxnLst>
+                <a:cxn ang="0">
+                  <a:pos x="T0" y="T1"/>
+                </a:cxn>
+                <a:cxn ang="0">
+                  <a:pos x="T2" y="T3"/>
+                </a:cxn>
+              </a:cxnLst>
+              <a:rect l="0" t="0" r="r" b="b"/>
+              <a:pathLst>
+                <a:path w="774" h="1440">
+                  <a:moveTo>
+                    <a:pt x="774" y="0"/>
+                  </a:moveTo>
+                  <a:cubicBezTo>
+                    <a:pt x="312" y="240"/>
+                    <a:pt x="0" y="1034"/>
+                    <a:pt x="411" y="1440"/>
+                  </a:cubicBezTo>
+                </a:path>
+              </a:pathLst>
+            </a:custGeom>
+            <a:noFill/>
+            <a:ln w="9525" cap="flat">
+              <a:solidFill>
+                <a:schemeClr val="tx1">
+                  <a:alpha val="10000"/>
+                </a:schemeClr>
+              </a:solidFill>
+              <a:prstDash val="dash"/>
+              <a:miter lim="800000"/>
+              <a:headEnd/>
+              <a:tailEnd/>
+            </a:ln>
+            <a:extLst>
+              <a:ext uri="{909E8E84-426E-40DD-AFC4-6F175D3DCCD1}">
+                <a14:hiddenFill xmlns:a14="http://schemas.microsoft.com/office/drawing/2010/main">
+                  <a:solidFill>
+                    <a:srgbClr val="FFFFFF"/>
+                  </a:solidFill>
+                </a14:hiddenFill>
+              </a:ext>
+            </a:extLst>
+          </p:spPr>
+          <p:txBody>
+            <a:bodyPr vert="horz" wrap="square" lIns="91440" tIns="45720" rIns="91440" bIns="45720" numCol="1" anchor="t" anchorCtr="0" compatLnSpc="1">
+              <a:prstTxWarp prst="textNoShape">
+                <a:avLst/>
+              </a:prstTxWarp>
+            </a:bodyPr>
+            <a:lstStyle/>
+            <a:p>
+              <a:endParaRPr lang="en-US"/>
+            </a:p>
+          </p:txBody>
+        </p:sp>
+        <p:sp>
+          <p:nvSpPr>
+            <p:cNvPr id="95" name="Freeform 9">
+              <a:extLst>
+                <a:ext uri="{FF2B5EF4-FFF2-40B4-BE49-F238E27FC236}">
+                  <a16:creationId xmlns:a16="http://schemas.microsoft.com/office/drawing/2014/main" id="{1AEB045A-6821-475B-A28E-047437ABEF5E}"/>
+                </a:ext>
+                <a:ext uri="{C183D7F6-B498-43B3-948B-1728B52AA6E4}">
+                  <adec:decorative xmlns:adec="http://schemas.microsoft.com/office/drawing/2017/decorative" val="1"/>
+                </a:ext>
+              </a:extLst>
+            </p:cNvPr>
+            <p:cNvSpPr>
+              <a:spLocks/>
+            </p:cNvSpPr>
+            <p:nvPr>
+              <p:extLst>
+                <p:ext uri="{386F3935-93C4-4BCD-93E2-E3B085C9AB24}">
+                  <p16:designElem xmlns:p16="http://schemas.microsoft.com/office/powerpoint/2015/main" val="1"/>
+                </p:ext>
+              </p:extLst>
+            </p:nvPr>
+          </p:nvSpPr>
+          <p:spPr bwMode="auto">
+            <a:xfrm>
+              <a:off x="11202988" y="9525"/>
+              <a:ext cx="963613" cy="366713"/>
+            </a:xfrm>
+            <a:custGeom>
+              <a:avLst/>
+              <a:gdLst>
+                <a:gd name="T0" fmla="*/ 203 w 203"/>
+                <a:gd name="T1" fmla="*/ 77 h 77"/>
+                <a:gd name="T2" fmla="*/ 0 w 203"/>
+                <a:gd name="T3" fmla="*/ 0 h 77"/>
+              </a:gdLst>
+              <a:ahLst/>
+              <a:cxnLst>
+                <a:cxn ang="0">
+                  <a:pos x="T0" y="T1"/>
+                </a:cxn>
+                <a:cxn ang="0">
+                  <a:pos x="T2" y="T3"/>
+                </a:cxn>
+              </a:cxnLst>
+              <a:rect l="0" t="0" r="r" b="b"/>
+              <a:pathLst>
+                <a:path w="203" h="77">
+                  <a:moveTo>
+                    <a:pt x="203" y="77"/>
+                  </a:moveTo>
+                  <a:cubicBezTo>
+                    <a:pt x="138" y="46"/>
+                    <a:pt x="68" y="21"/>
+                    <a:pt x="0" y="0"/>
+                  </a:cubicBezTo>
+                </a:path>
+              </a:pathLst>
+            </a:custGeom>
+            <a:noFill/>
+            <a:ln w="9525" cap="flat">
+              <a:solidFill>
+                <a:schemeClr val="tx1">
+                  <a:alpha val="10000"/>
+                </a:schemeClr>
+              </a:solidFill>
+              <a:prstDash val="dash"/>
+              <a:miter lim="800000"/>
+              <a:headEnd/>
+              <a:tailEnd/>
+            </a:ln>
+            <a:extLst>
+              <a:ext uri="{909E8E84-426E-40DD-AFC4-6F175D3DCCD1}">
+                <a14:hiddenFill xmlns:a14="http://schemas.microsoft.com/office/drawing/2010/main">
+                  <a:solidFill>
+                    <a:srgbClr val="FFFFFF"/>
+                  </a:solidFill>
+                </a14:hiddenFill>
+              </a:ext>
+            </a:extLst>
+          </p:spPr>
+          <p:txBody>
+            <a:bodyPr vert="horz" wrap="square" lIns="91440" tIns="45720" rIns="91440" bIns="45720" numCol="1" anchor="t" anchorCtr="0" compatLnSpc="1">
+              <a:prstTxWarp prst="textNoShape">
+                <a:avLst/>
+              </a:prstTxWarp>
+            </a:bodyPr>
+            <a:lstStyle/>
+            <a:p>
+              <a:endParaRPr lang="en-US"/>
+            </a:p>
+          </p:txBody>
+        </p:sp>
+        <p:sp>
+          <p:nvSpPr>
+            <p:cNvPr id="96" name="Freeform 10">
+              <a:extLst>
+                <a:ext uri="{FF2B5EF4-FFF2-40B4-BE49-F238E27FC236}">
+                  <a16:creationId xmlns:a16="http://schemas.microsoft.com/office/drawing/2014/main" id="{D9B790C0-3D34-4626-BAFB-6EB473F40C72}"/>
+                </a:ext>
+                <a:ext uri="{C183D7F6-B498-43B3-948B-1728B52AA6E4}">
+                  <adec:decorative xmlns:adec="http://schemas.microsoft.com/office/drawing/2017/decorative" val="1"/>
+                </a:ext>
+              </a:extLst>
+            </p:cNvPr>
+            <p:cNvSpPr>
+              <a:spLocks/>
+            </p:cNvSpPr>
+            <p:nvPr>
+              <p:extLst>
+                <p:ext uri="{386F3935-93C4-4BCD-93E2-E3B085C9AB24}">
+                  <p16:designElem xmlns:p16="http://schemas.microsoft.com/office/powerpoint/2015/main" val="1"/>
+                </p:ext>
+              </p:extLst>
+            </p:nvPr>
+          </p:nvSpPr>
+          <p:spPr bwMode="auto">
+            <a:xfrm>
+              <a:off x="10494963" y="5275263"/>
+              <a:ext cx="1666875" cy="1577975"/>
+            </a:xfrm>
+            <a:custGeom>
+              <a:avLst/>
+              <a:gdLst>
+                <a:gd name="T0" fmla="*/ 0 w 351"/>
+                <a:gd name="T1" fmla="*/ 332 h 332"/>
+                <a:gd name="T2" fmla="*/ 351 w 351"/>
+                <a:gd name="T3" fmla="*/ 0 h 332"/>
+              </a:gdLst>
+              <a:ahLst/>
+              <a:cxnLst>
+                <a:cxn ang="0">
+                  <a:pos x="T0" y="T1"/>
+                </a:cxn>
+                <a:cxn ang="0">
+                  <a:pos x="T2" y="T3"/>
+                </a:cxn>
+              </a:cxnLst>
+              <a:rect l="0" t="0" r="r" b="b"/>
+              <a:pathLst>
+                <a:path w="351" h="332">
+                  <a:moveTo>
+                    <a:pt x="0" y="332"/>
+                  </a:moveTo>
+                  <a:cubicBezTo>
+                    <a:pt x="125" y="232"/>
+                    <a:pt x="245" y="121"/>
+                    <a:pt x="351" y="0"/>
+                  </a:cubicBezTo>
+                </a:path>
+              </a:pathLst>
+            </a:custGeom>
+            <a:noFill/>
+            <a:ln w="9525" cap="flat">
+              <a:solidFill>
+                <a:schemeClr val="tx1">
+                  <a:alpha val="10000"/>
+                </a:schemeClr>
+              </a:solidFill>
+              <a:prstDash val="dash"/>
+              <a:miter lim="800000"/>
+              <a:headEnd/>
+              <a:tailEnd/>
+            </a:ln>
+            <a:extLst>
+              <a:ext uri="{909E8E84-426E-40DD-AFC4-6F175D3DCCD1}">
+                <a14:hiddenFill xmlns:a14="http://schemas.microsoft.com/office/drawing/2010/main">
+                  <a:solidFill>
+                    <a:srgbClr val="FFFFFF"/>
+                  </a:solidFill>
+                </a14:hiddenFill>
+              </a:ext>
+            </a:extLst>
+          </p:spPr>
+          <p:txBody>
+            <a:bodyPr vert="horz" wrap="square" lIns="91440" tIns="45720" rIns="91440" bIns="45720" numCol="1" anchor="t" anchorCtr="0" compatLnSpc="1">
+              <a:prstTxWarp prst="textNoShape">
+                <a:avLst/>
+              </a:prstTxWarp>
+            </a:bodyPr>
+            <a:lstStyle/>
+            <a:p>
+              <a:endParaRPr lang="en-US"/>
+            </a:p>
+          </p:txBody>
+        </p:sp>
+        <p:sp>
+          <p:nvSpPr>
+            <p:cNvPr id="97" name="Freeform 11">
+              <a:extLst>
+                <a:ext uri="{FF2B5EF4-FFF2-40B4-BE49-F238E27FC236}">
+                  <a16:creationId xmlns:a16="http://schemas.microsoft.com/office/drawing/2014/main" id="{EDA4D87F-91A4-4628-9A6E-F01820A7EE54}"/>
+                </a:ext>
+                <a:ext uri="{C183D7F6-B498-43B3-948B-1728B52AA6E4}">
+                  <adec:decorative xmlns:adec="http://schemas.microsoft.com/office/drawing/2017/decorative" val="1"/>
+                </a:ext>
+              </a:extLst>
+            </p:cNvPr>
+            <p:cNvSpPr>
+              <a:spLocks/>
+            </p:cNvSpPr>
+            <p:nvPr>
+              <p:extLst>
+                <p:ext uri="{386F3935-93C4-4BCD-93E2-E3B085C9AB24}">
+                  <p16:designElem xmlns:p16="http://schemas.microsoft.com/office/powerpoint/2015/main" val="1"/>
+                </p:ext>
+              </p:extLst>
+            </p:nvPr>
+          </p:nvSpPr>
+          <p:spPr bwMode="auto">
+            <a:xfrm>
+              <a:off x="1001713" y="0"/>
+              <a:ext cx="3621088" cy="6843713"/>
+            </a:xfrm>
+            <a:custGeom>
+              <a:avLst/>
+              <a:gdLst>
+                <a:gd name="T0" fmla="*/ 762 w 762"/>
+                <a:gd name="T1" fmla="*/ 0 h 1440"/>
+                <a:gd name="T2" fmla="*/ 403 w 762"/>
+                <a:gd name="T3" fmla="*/ 1440 h 1440"/>
+              </a:gdLst>
+              <a:ahLst/>
+              <a:cxnLst>
+                <a:cxn ang="0">
+                  <a:pos x="T0" y="T1"/>
+                </a:cxn>
+                <a:cxn ang="0">
+                  <a:pos x="T2" y="T3"/>
+                </a:cxn>
+              </a:cxnLst>
+              <a:rect l="0" t="0" r="r" b="b"/>
+              <a:pathLst>
+                <a:path w="762" h="1440">
+                  <a:moveTo>
+                    <a:pt x="762" y="0"/>
+                  </a:moveTo>
+                  <a:cubicBezTo>
+                    <a:pt x="308" y="245"/>
+                    <a:pt x="0" y="1033"/>
+                    <a:pt x="403" y="1440"/>
+                  </a:cubicBezTo>
+                </a:path>
+              </a:pathLst>
+            </a:custGeom>
+            <a:noFill/>
+            <a:ln w="9525" cap="flat">
+              <a:solidFill>
+                <a:schemeClr val="tx1">
+                  <a:alpha val="10000"/>
+                </a:schemeClr>
+              </a:solidFill>
+              <a:prstDash val="solid"/>
+              <a:miter lim="800000"/>
+              <a:headEnd/>
+              <a:tailEnd/>
+            </a:ln>
+            <a:extLst>
+              <a:ext uri="{909E8E84-426E-40DD-AFC4-6F175D3DCCD1}">
+                <a14:hiddenFill xmlns:a14="http://schemas.microsoft.com/office/drawing/2010/main">
+                  <a:solidFill>
+                    <a:srgbClr val="FFFFFF"/>
+                  </a:solidFill>
+                </a14:hiddenFill>
+              </a:ext>
+            </a:extLst>
+          </p:spPr>
+          <p:txBody>
+            <a:bodyPr vert="horz" wrap="square" lIns="91440" tIns="45720" rIns="91440" bIns="45720" numCol="1" anchor="t" anchorCtr="0" compatLnSpc="1">
+              <a:prstTxWarp prst="textNoShape">
+                <a:avLst/>
+              </a:prstTxWarp>
+            </a:bodyPr>
+            <a:lstStyle/>
+            <a:p>
+              <a:endParaRPr lang="en-US"/>
+            </a:p>
+          </p:txBody>
+        </p:sp>
+        <p:sp>
+          <p:nvSpPr>
+            <p:cNvPr id="98" name="Freeform 12">
+              <a:extLst>
+                <a:ext uri="{FF2B5EF4-FFF2-40B4-BE49-F238E27FC236}">
+                  <a16:creationId xmlns:a16="http://schemas.microsoft.com/office/drawing/2014/main" id="{045DAB88-124C-459C-A889-DAE9C9BE285A}"/>
+                </a:ext>
+                <a:ext uri="{C183D7F6-B498-43B3-948B-1728B52AA6E4}">
+                  <adec:decorative xmlns:adec="http://schemas.microsoft.com/office/drawing/2017/decorative" val="1"/>
+                </a:ext>
+              </a:extLst>
+            </p:cNvPr>
+            <p:cNvSpPr>
+              <a:spLocks/>
+            </p:cNvSpPr>
+            <p:nvPr>
+              <p:extLst>
+                <p:ext uri="{386F3935-93C4-4BCD-93E2-E3B085C9AB24}">
+                  <p16:designElem xmlns:p16="http://schemas.microsoft.com/office/powerpoint/2015/main" val="1"/>
+                </p:ext>
+              </p:extLst>
+            </p:nvPr>
+          </p:nvSpPr>
+          <p:spPr bwMode="auto">
+            <a:xfrm>
+              <a:off x="11501438" y="9525"/>
+              <a:ext cx="665163" cy="257175"/>
+            </a:xfrm>
+            <a:custGeom>
+              <a:avLst/>
+              <a:gdLst>
+                <a:gd name="T0" fmla="*/ 140 w 140"/>
+                <a:gd name="T1" fmla="*/ 54 h 54"/>
+                <a:gd name="T2" fmla="*/ 0 w 140"/>
+                <a:gd name="T3" fmla="*/ 0 h 54"/>
+              </a:gdLst>
+              <a:ahLst/>
+              <a:cxnLst>
+                <a:cxn ang="0">
+                  <a:pos x="T0" y="T1"/>
+                </a:cxn>
+                <a:cxn ang="0">
+                  <a:pos x="T2" y="T3"/>
+                </a:cxn>
+              </a:cxnLst>
+              <a:rect l="0" t="0" r="r" b="b"/>
+              <a:pathLst>
+                <a:path w="140" h="54">
+                  <a:moveTo>
+                    <a:pt x="140" y="54"/>
+                  </a:moveTo>
+                  <a:cubicBezTo>
+                    <a:pt x="95" y="34"/>
+                    <a:pt x="48" y="16"/>
+                    <a:pt x="0" y="0"/>
+                  </a:cubicBezTo>
+                </a:path>
+              </a:pathLst>
+            </a:custGeom>
+            <a:noFill/>
+            <a:ln w="9525" cap="flat">
+              <a:solidFill>
+                <a:schemeClr val="tx1">
+                  <a:alpha val="10000"/>
+                </a:schemeClr>
+              </a:solidFill>
+              <a:prstDash val="solid"/>
+              <a:miter lim="800000"/>
+              <a:headEnd/>
+              <a:tailEnd/>
+            </a:ln>
+            <a:extLst>
+              <a:ext uri="{909E8E84-426E-40DD-AFC4-6F175D3DCCD1}">
+                <a14:hiddenFill xmlns:a14="http://schemas.microsoft.com/office/drawing/2010/main">
+                  <a:solidFill>
+                    <a:srgbClr val="FFFFFF"/>
+                  </a:solidFill>
+                </a14:hiddenFill>
+              </a:ext>
+            </a:extLst>
+          </p:spPr>
+          <p:txBody>
+            <a:bodyPr vert="horz" wrap="square" lIns="91440" tIns="45720" rIns="91440" bIns="45720" numCol="1" anchor="t" anchorCtr="0" compatLnSpc="1">
+              <a:prstTxWarp prst="textNoShape">
+                <a:avLst/>
+              </a:prstTxWarp>
+            </a:bodyPr>
+            <a:lstStyle/>
+            <a:p>
+              <a:endParaRPr lang="en-US"/>
+            </a:p>
+          </p:txBody>
+        </p:sp>
+        <p:sp>
+          <p:nvSpPr>
+            <p:cNvPr id="99" name="Freeform 13">
+              <a:extLst>
+                <a:ext uri="{FF2B5EF4-FFF2-40B4-BE49-F238E27FC236}">
+                  <a16:creationId xmlns:a16="http://schemas.microsoft.com/office/drawing/2014/main" id="{85D44010-1DAA-4CAC-B83F-7E3E8C455D4F}"/>
+                </a:ext>
+                <a:ext uri="{C183D7F6-B498-43B3-948B-1728B52AA6E4}">
+                  <adec:decorative xmlns:adec="http://schemas.microsoft.com/office/drawing/2017/decorative" val="1"/>
+                </a:ext>
+              </a:extLst>
+            </p:cNvPr>
+            <p:cNvSpPr>
+              <a:spLocks/>
+            </p:cNvSpPr>
+            <p:nvPr>
+              <p:extLst>
+                <p:ext uri="{386F3935-93C4-4BCD-93E2-E3B085C9AB24}">
+                  <p16:designElem xmlns:p16="http://schemas.microsoft.com/office/powerpoint/2015/main" val="1"/>
+                </p:ext>
+              </p:extLst>
+            </p:nvPr>
+          </p:nvSpPr>
+          <p:spPr bwMode="auto">
+            <a:xfrm>
+              <a:off x="10641013" y="5408613"/>
+              <a:ext cx="1525588" cy="1435100"/>
+            </a:xfrm>
+            <a:custGeom>
+              <a:avLst/>
+              <a:gdLst>
+                <a:gd name="T0" fmla="*/ 0 w 321"/>
+                <a:gd name="T1" fmla="*/ 302 h 302"/>
+                <a:gd name="T2" fmla="*/ 321 w 321"/>
+                <a:gd name="T3" fmla="*/ 0 h 302"/>
+              </a:gdLst>
+              <a:ahLst/>
+              <a:cxnLst>
+                <a:cxn ang="0">
+                  <a:pos x="T0" y="T1"/>
+                </a:cxn>
+                <a:cxn ang="0">
+                  <a:pos x="T2" y="T3"/>
+                </a:cxn>
+              </a:cxnLst>
+              <a:rect l="0" t="0" r="r" b="b"/>
+              <a:pathLst>
+                <a:path w="321" h="302">
+                  <a:moveTo>
+                    <a:pt x="0" y="302"/>
+                  </a:moveTo>
+                  <a:cubicBezTo>
+                    <a:pt x="114" y="210"/>
+                    <a:pt x="223" y="109"/>
+                    <a:pt x="321" y="0"/>
+                  </a:cubicBezTo>
+                </a:path>
+              </a:pathLst>
+            </a:custGeom>
+            <a:noFill/>
+            <a:ln w="9525" cap="flat">
+              <a:solidFill>
+                <a:schemeClr val="tx1">
+                  <a:alpha val="10000"/>
+                </a:schemeClr>
+              </a:solidFill>
+              <a:prstDash val="solid"/>
+              <a:miter lim="800000"/>
+              <a:headEnd/>
+              <a:tailEnd/>
+            </a:ln>
+            <a:extLst>
+              <a:ext uri="{909E8E84-426E-40DD-AFC4-6F175D3DCCD1}">
+                <a14:hiddenFill xmlns:a14="http://schemas.microsoft.com/office/drawing/2010/main">
+                  <a:solidFill>
+                    <a:srgbClr val="FFFFFF"/>
+                  </a:solidFill>
+                </a14:hiddenFill>
+              </a:ext>
+            </a:extLst>
+          </p:spPr>
+          <p:txBody>
+            <a:bodyPr vert="horz" wrap="square" lIns="91440" tIns="45720" rIns="91440" bIns="45720" numCol="1" anchor="t" anchorCtr="0" compatLnSpc="1">
+              <a:prstTxWarp prst="textNoShape">
+                <a:avLst/>
+              </a:prstTxWarp>
+            </a:bodyPr>
+            <a:lstStyle/>
+            <a:p>
+              <a:endParaRPr lang="en-US"/>
+            </a:p>
+          </p:txBody>
+        </p:sp>
+        <p:sp>
+          <p:nvSpPr>
+            <p:cNvPr id="100" name="Freeform 14">
+              <a:extLst>
+                <a:ext uri="{FF2B5EF4-FFF2-40B4-BE49-F238E27FC236}">
+                  <a16:creationId xmlns:a16="http://schemas.microsoft.com/office/drawing/2014/main" id="{E8C01D66-5C93-4A2E-AA74-DE97574EA4E9}"/>
+                </a:ext>
+                <a:ext uri="{C183D7F6-B498-43B3-948B-1728B52AA6E4}">
+                  <adec:decorative xmlns:adec="http://schemas.microsoft.com/office/drawing/2017/decorative" val="1"/>
+                </a:ext>
+              </a:extLst>
+            </p:cNvPr>
+            <p:cNvSpPr>
+              <a:spLocks/>
+            </p:cNvSpPr>
+            <p:nvPr>
+              <p:extLst>
+                <p:ext uri="{386F3935-93C4-4BCD-93E2-E3B085C9AB24}">
+                  <p16:designElem xmlns:p16="http://schemas.microsoft.com/office/powerpoint/2015/main" val="1"/>
+                </p:ext>
+              </p:extLst>
+            </p:nvPr>
+          </p:nvSpPr>
+          <p:spPr bwMode="auto">
+            <a:xfrm>
+              <a:off x="1001713" y="0"/>
+              <a:ext cx="3244850" cy="6843713"/>
+            </a:xfrm>
+            <a:custGeom>
+              <a:avLst/>
+              <a:gdLst>
+                <a:gd name="T0" fmla="*/ 683 w 683"/>
+                <a:gd name="T1" fmla="*/ 0 h 1440"/>
+                <a:gd name="T2" fmla="*/ 355 w 683"/>
+                <a:gd name="T3" fmla="*/ 1440 h 1440"/>
+              </a:gdLst>
+              <a:ahLst/>
+              <a:cxnLst>
+                <a:cxn ang="0">
+                  <a:pos x="T0" y="T1"/>
+                </a:cxn>
+                <a:cxn ang="0">
+                  <a:pos x="T2" y="T3"/>
+                </a:cxn>
+              </a:cxnLst>
+              <a:rect l="0" t="0" r="r" b="b"/>
+              <a:pathLst>
+                <a:path w="683" h="1440">
+                  <a:moveTo>
+                    <a:pt x="683" y="0"/>
+                  </a:moveTo>
+                  <a:cubicBezTo>
+                    <a:pt x="258" y="256"/>
+                    <a:pt x="0" y="1041"/>
+                    <a:pt x="355" y="1440"/>
+                  </a:cubicBezTo>
+                </a:path>
+              </a:pathLst>
+            </a:custGeom>
+            <a:noFill/>
+            <a:ln w="9525" cap="flat">
+              <a:solidFill>
+                <a:schemeClr val="tx1">
+                  <a:alpha val="10000"/>
+                </a:schemeClr>
+              </a:solidFill>
+              <a:prstDash val="solid"/>
+              <a:miter lim="800000"/>
+              <a:headEnd/>
+              <a:tailEnd/>
+            </a:ln>
+            <a:extLst>
+              <a:ext uri="{909E8E84-426E-40DD-AFC4-6F175D3DCCD1}">
+                <a14:hiddenFill xmlns:a14="http://schemas.microsoft.com/office/drawing/2010/main">
+                  <a:solidFill>
+                    <a:srgbClr val="FFFFFF"/>
+                  </a:solidFill>
+                </a14:hiddenFill>
+              </a:ext>
+            </a:extLst>
+          </p:spPr>
+          <p:txBody>
+            <a:bodyPr vert="horz" wrap="square" lIns="91440" tIns="45720" rIns="91440" bIns="45720" numCol="1" anchor="t" anchorCtr="0" compatLnSpc="1">
+              <a:prstTxWarp prst="textNoShape">
+                <a:avLst/>
+              </a:prstTxWarp>
+            </a:bodyPr>
+            <a:lstStyle/>
+            <a:p>
+              <a:endParaRPr lang="en-US"/>
+            </a:p>
+          </p:txBody>
+        </p:sp>
+        <p:sp>
+          <p:nvSpPr>
+            <p:cNvPr id="101" name="Freeform 15">
+              <a:extLst>
+                <a:ext uri="{FF2B5EF4-FFF2-40B4-BE49-F238E27FC236}">
+                  <a16:creationId xmlns:a16="http://schemas.microsoft.com/office/drawing/2014/main" id="{E2E1A6E1-6C4A-47D3-81E2-9F8624F1BBE0}"/>
+                </a:ext>
+                <a:ext uri="{C183D7F6-B498-43B3-948B-1728B52AA6E4}">
+                  <adec:decorative xmlns:adec="http://schemas.microsoft.com/office/drawing/2017/decorative" val="1"/>
+                </a:ext>
+              </a:extLst>
+            </p:cNvPr>
+            <p:cNvSpPr>
+              <a:spLocks/>
+            </p:cNvSpPr>
+            <p:nvPr>
+              <p:extLst>
+                <p:ext uri="{386F3935-93C4-4BCD-93E2-E3B085C9AB24}">
+                  <p16:designElem xmlns:p16="http://schemas.microsoft.com/office/powerpoint/2015/main" val="1"/>
+                </p:ext>
+              </p:extLst>
+            </p:nvPr>
+          </p:nvSpPr>
+          <p:spPr bwMode="auto">
+            <a:xfrm>
+              <a:off x="10802938" y="5518150"/>
+              <a:ext cx="1363663" cy="1325563"/>
+            </a:xfrm>
+            <a:custGeom>
+              <a:avLst/>
+              <a:gdLst>
+                <a:gd name="T0" fmla="*/ 0 w 287"/>
+                <a:gd name="T1" fmla="*/ 279 h 279"/>
+                <a:gd name="T2" fmla="*/ 287 w 287"/>
+                <a:gd name="T3" fmla="*/ 0 h 279"/>
+              </a:gdLst>
+              <a:ahLst/>
+              <a:cxnLst>
+                <a:cxn ang="0">
+                  <a:pos x="T0" y="T1"/>
+                </a:cxn>
+                <a:cxn ang="0">
+                  <a:pos x="T2" y="T3"/>
+                </a:cxn>
+              </a:cxnLst>
+              <a:rect l="0" t="0" r="r" b="b"/>
+              <a:pathLst>
+                <a:path w="287" h="279">
+                  <a:moveTo>
+                    <a:pt x="0" y="279"/>
+                  </a:moveTo>
+                  <a:cubicBezTo>
+                    <a:pt x="101" y="193"/>
+                    <a:pt x="198" y="100"/>
+                    <a:pt x="287" y="0"/>
+                  </a:cubicBezTo>
+                </a:path>
+              </a:pathLst>
+            </a:custGeom>
+            <a:noFill/>
+            <a:ln w="9525" cap="flat">
+              <a:solidFill>
+                <a:schemeClr val="tx1">
+                  <a:alpha val="10000"/>
+                </a:schemeClr>
+              </a:solidFill>
+              <a:prstDash val="solid"/>
+              <a:miter lim="800000"/>
+              <a:headEnd/>
+              <a:tailEnd/>
+            </a:ln>
+            <a:extLst>
+              <a:ext uri="{909E8E84-426E-40DD-AFC4-6F175D3DCCD1}">
+                <a14:hiddenFill xmlns:a14="http://schemas.microsoft.com/office/drawing/2010/main">
+                  <a:solidFill>
+                    <a:srgbClr val="FFFFFF"/>
+                  </a:solidFill>
+                </a14:hiddenFill>
+              </a:ext>
+            </a:extLst>
+          </p:spPr>
+          <p:txBody>
+            <a:bodyPr vert="horz" wrap="square" lIns="91440" tIns="45720" rIns="91440" bIns="45720" numCol="1" anchor="t" anchorCtr="0" compatLnSpc="1">
+              <a:prstTxWarp prst="textNoShape">
+                <a:avLst/>
+              </a:prstTxWarp>
+            </a:bodyPr>
+            <a:lstStyle/>
+            <a:p>
+              <a:endParaRPr lang="en-US"/>
+            </a:p>
+          </p:txBody>
+        </p:sp>
+        <p:sp>
+          <p:nvSpPr>
+            <p:cNvPr id="102" name="Freeform 16">
+              <a:extLst>
+                <a:ext uri="{FF2B5EF4-FFF2-40B4-BE49-F238E27FC236}">
+                  <a16:creationId xmlns:a16="http://schemas.microsoft.com/office/drawing/2014/main" id="{3E849CB5-4526-49DC-B77B-A20FDB7FFDA4}"/>
+                </a:ext>
+                <a:ext uri="{C183D7F6-B498-43B3-948B-1728B52AA6E4}">
+                  <adec:decorative xmlns:adec="http://schemas.microsoft.com/office/drawing/2017/decorative" val="1"/>
+                </a:ext>
+              </a:extLst>
+            </p:cNvPr>
+            <p:cNvSpPr>
+              <a:spLocks/>
+            </p:cNvSpPr>
+            <p:nvPr>
+              <p:extLst>
+                <p:ext uri="{386F3935-93C4-4BCD-93E2-E3B085C9AB24}">
+                  <p16:designElem xmlns:p16="http://schemas.microsoft.com/office/powerpoint/2015/main" val="1"/>
+                </p:ext>
+              </p:extLst>
+            </p:nvPr>
+          </p:nvSpPr>
+          <p:spPr bwMode="auto">
+            <a:xfrm>
+              <a:off x="889000" y="0"/>
+              <a:ext cx="3230563" cy="6843713"/>
+            </a:xfrm>
+            <a:custGeom>
+              <a:avLst/>
+              <a:gdLst>
+                <a:gd name="T0" fmla="*/ 680 w 680"/>
+                <a:gd name="T1" fmla="*/ 0 h 1440"/>
+                <a:gd name="T2" fmla="*/ 337 w 680"/>
+                <a:gd name="T3" fmla="*/ 1440 h 1440"/>
+              </a:gdLst>
+              <a:ahLst/>
+              <a:cxnLst>
+                <a:cxn ang="0">
+                  <a:pos x="T0" y="T1"/>
+                </a:cxn>
+                <a:cxn ang="0">
+                  <a:pos x="T2" y="T3"/>
+                </a:cxn>
+              </a:cxnLst>
+              <a:rect l="0" t="0" r="r" b="b"/>
+              <a:pathLst>
+                <a:path w="680" h="1440">
+                  <a:moveTo>
+                    <a:pt x="680" y="0"/>
+                  </a:moveTo>
+                  <a:cubicBezTo>
+                    <a:pt x="257" y="265"/>
+                    <a:pt x="0" y="1026"/>
+                    <a:pt x="337" y="1440"/>
+                  </a:cubicBezTo>
+                </a:path>
+              </a:pathLst>
+            </a:custGeom>
+            <a:noFill/>
+            <a:ln w="9525" cap="flat">
+              <a:solidFill>
+                <a:schemeClr val="tx1">
+                  <a:alpha val="10000"/>
+                </a:schemeClr>
+              </a:solidFill>
+              <a:prstDash val="solid"/>
+              <a:miter lim="800000"/>
+              <a:headEnd/>
+              <a:tailEnd/>
+            </a:ln>
+            <a:extLst>
+              <a:ext uri="{909E8E84-426E-40DD-AFC4-6F175D3DCCD1}">
+                <a14:hiddenFill xmlns:a14="http://schemas.microsoft.com/office/drawing/2010/main">
+                  <a:solidFill>
+                    <a:srgbClr val="FFFFFF"/>
+                  </a:solidFill>
+                </a14:hiddenFill>
+              </a:ext>
+            </a:extLst>
+          </p:spPr>
+          <p:txBody>
+            <a:bodyPr vert="horz" wrap="square" lIns="91440" tIns="45720" rIns="91440" bIns="45720" numCol="1" anchor="t" anchorCtr="0" compatLnSpc="1">
+              <a:prstTxWarp prst="textNoShape">
+                <a:avLst/>
+              </a:prstTxWarp>
+            </a:bodyPr>
+            <a:lstStyle/>
+            <a:p>
+              <a:endParaRPr lang="en-US"/>
+            </a:p>
+          </p:txBody>
+        </p:sp>
+        <p:sp>
+          <p:nvSpPr>
+            <p:cNvPr id="103" name="Freeform 17">
+              <a:extLst>
+                <a:ext uri="{FF2B5EF4-FFF2-40B4-BE49-F238E27FC236}">
+                  <a16:creationId xmlns:a16="http://schemas.microsoft.com/office/drawing/2014/main" id="{5A18C8A4-FB2A-44C1-93D3-26C6DDFE0CC4}"/>
+                </a:ext>
+                <a:ext uri="{C183D7F6-B498-43B3-948B-1728B52AA6E4}">
+                  <adec:decorative xmlns:adec="http://schemas.microsoft.com/office/drawing/2017/decorative" val="1"/>
+                </a:ext>
+              </a:extLst>
+            </p:cNvPr>
+            <p:cNvSpPr>
+              <a:spLocks/>
+            </p:cNvSpPr>
+            <p:nvPr>
+              <p:extLst>
+                <p:ext uri="{386F3935-93C4-4BCD-93E2-E3B085C9AB24}">
+                  <p16:designElem xmlns:p16="http://schemas.microsoft.com/office/powerpoint/2015/main" val="1"/>
+                </p:ext>
+              </p:extLst>
+            </p:nvPr>
+          </p:nvSpPr>
+          <p:spPr bwMode="auto">
+            <a:xfrm>
+              <a:off x="10979150" y="5694363"/>
+              <a:ext cx="1187450" cy="1149350"/>
+            </a:xfrm>
+            <a:custGeom>
+              <a:avLst/>
+              <a:gdLst>
+                <a:gd name="T0" fmla="*/ 0 w 250"/>
+                <a:gd name="T1" fmla="*/ 242 h 242"/>
+                <a:gd name="T2" fmla="*/ 250 w 250"/>
+                <a:gd name="T3" fmla="*/ 0 h 242"/>
+              </a:gdLst>
+              <a:ahLst/>
+              <a:cxnLst>
+                <a:cxn ang="0">
+                  <a:pos x="T0" y="T1"/>
+                </a:cxn>
+                <a:cxn ang="0">
+                  <a:pos x="T2" y="T3"/>
+                </a:cxn>
+              </a:cxnLst>
+              <a:rect l="0" t="0" r="r" b="b"/>
+              <a:pathLst>
+                <a:path w="250" h="242">
+                  <a:moveTo>
+                    <a:pt x="0" y="242"/>
+                  </a:moveTo>
+                  <a:cubicBezTo>
+                    <a:pt x="88" y="166"/>
+                    <a:pt x="172" y="85"/>
+                    <a:pt x="250" y="0"/>
+                  </a:cubicBezTo>
+                </a:path>
+              </a:pathLst>
+            </a:custGeom>
+            <a:noFill/>
+            <a:ln w="9525" cap="flat">
+              <a:solidFill>
+                <a:schemeClr val="tx1">
+                  <a:alpha val="10000"/>
+                </a:schemeClr>
+              </a:solidFill>
+              <a:prstDash val="solid"/>
+              <a:miter lim="800000"/>
+              <a:headEnd/>
+              <a:tailEnd/>
+            </a:ln>
+            <a:extLst>
+              <a:ext uri="{909E8E84-426E-40DD-AFC4-6F175D3DCCD1}">
+                <a14:hiddenFill xmlns:a14="http://schemas.microsoft.com/office/drawing/2010/main">
+                  <a:solidFill>
+                    <a:srgbClr val="FFFFFF"/>
+                  </a:solidFill>
+                </a14:hiddenFill>
+              </a:ext>
+            </a:extLst>
+          </p:spPr>
+          <p:txBody>
+            <a:bodyPr vert="horz" wrap="square" lIns="91440" tIns="45720" rIns="91440" bIns="45720" numCol="1" anchor="t" anchorCtr="0" compatLnSpc="1">
+              <a:prstTxWarp prst="textNoShape">
+                <a:avLst/>
+              </a:prstTxWarp>
+            </a:bodyPr>
+            <a:lstStyle/>
+            <a:p>
+              <a:endParaRPr lang="en-US"/>
+            </a:p>
+          </p:txBody>
+        </p:sp>
+        <p:sp>
+          <p:nvSpPr>
+            <p:cNvPr id="104" name="Freeform 18">
+              <a:extLst>
+                <a:ext uri="{FF2B5EF4-FFF2-40B4-BE49-F238E27FC236}">
+                  <a16:creationId xmlns:a16="http://schemas.microsoft.com/office/drawing/2014/main" id="{85D014FD-8C5A-4071-B19E-4910AAB6186B}"/>
+                </a:ext>
+                <a:ext uri="{C183D7F6-B498-43B3-948B-1728B52AA6E4}">
+                  <adec:decorative xmlns:adec="http://schemas.microsoft.com/office/drawing/2017/decorative" val="1"/>
+                </a:ext>
+              </a:extLst>
+            </p:cNvPr>
+            <p:cNvSpPr>
+              <a:spLocks/>
+            </p:cNvSpPr>
+            <p:nvPr>
+              <p:extLst>
+                <p:ext uri="{386F3935-93C4-4BCD-93E2-E3B085C9AB24}">
+                  <p16:designElem xmlns:p16="http://schemas.microsoft.com/office/powerpoint/2015/main" val="1"/>
+                </p:ext>
+              </p:extLst>
+            </p:nvPr>
+          </p:nvSpPr>
+          <p:spPr bwMode="auto">
+            <a:xfrm>
+              <a:off x="484188" y="0"/>
+              <a:ext cx="3421063" cy="6843713"/>
+            </a:xfrm>
+            <a:custGeom>
+              <a:avLst/>
+              <a:gdLst>
+                <a:gd name="T0" fmla="*/ 720 w 720"/>
+                <a:gd name="T1" fmla="*/ 0 h 1440"/>
+                <a:gd name="T2" fmla="*/ 362 w 720"/>
+                <a:gd name="T3" fmla="*/ 1440 h 1440"/>
+              </a:gdLst>
+              <a:ahLst/>
+              <a:cxnLst>
+                <a:cxn ang="0">
+                  <a:pos x="T0" y="T1"/>
+                </a:cxn>
+                <a:cxn ang="0">
+                  <a:pos x="T2" y="T3"/>
+                </a:cxn>
+              </a:cxnLst>
+              <a:rect l="0" t="0" r="r" b="b"/>
+              <a:pathLst>
+                <a:path w="720" h="1440">
+                  <a:moveTo>
+                    <a:pt x="720" y="0"/>
+                  </a:moveTo>
+                  <a:cubicBezTo>
+                    <a:pt x="316" y="282"/>
+                    <a:pt x="0" y="1018"/>
+                    <a:pt x="362" y="1440"/>
+                  </a:cubicBezTo>
+                </a:path>
+              </a:pathLst>
+            </a:custGeom>
+            <a:noFill/>
+            <a:ln w="9525" cap="flat">
+              <a:solidFill>
+                <a:schemeClr val="tx1">
+                  <a:alpha val="10000"/>
+                </a:schemeClr>
+              </a:solidFill>
+              <a:prstDash val="solid"/>
+              <a:miter lim="800000"/>
+              <a:headEnd/>
+              <a:tailEnd/>
+            </a:ln>
+            <a:extLst>
+              <a:ext uri="{909E8E84-426E-40DD-AFC4-6F175D3DCCD1}">
+                <a14:hiddenFill xmlns:a14="http://schemas.microsoft.com/office/drawing/2010/main">
+                  <a:solidFill>
+                    <a:srgbClr val="FFFFFF"/>
+                  </a:solidFill>
+                </a14:hiddenFill>
+              </a:ext>
+            </a:extLst>
+          </p:spPr>
+          <p:txBody>
+            <a:bodyPr vert="horz" wrap="square" lIns="91440" tIns="45720" rIns="91440" bIns="45720" numCol="1" anchor="t" anchorCtr="0" compatLnSpc="1">
+              <a:prstTxWarp prst="textNoShape">
+                <a:avLst/>
+              </a:prstTxWarp>
+            </a:bodyPr>
+            <a:lstStyle/>
+            <a:p>
+              <a:endParaRPr lang="en-US"/>
+            </a:p>
+          </p:txBody>
+        </p:sp>
+        <p:sp>
+          <p:nvSpPr>
+            <p:cNvPr id="105" name="Freeform 19">
+              <a:extLst>
+                <a:ext uri="{FF2B5EF4-FFF2-40B4-BE49-F238E27FC236}">
+                  <a16:creationId xmlns:a16="http://schemas.microsoft.com/office/drawing/2014/main" id="{A37D7262-3596-4026-9AD4-E94332E52603}"/>
+                </a:ext>
+                <a:ext uri="{C183D7F6-B498-43B3-948B-1728B52AA6E4}">
+                  <adec:decorative xmlns:adec="http://schemas.microsoft.com/office/drawing/2017/decorative" val="1"/>
+                </a:ext>
+              </a:extLst>
+            </p:cNvPr>
+            <p:cNvSpPr>
+              <a:spLocks/>
+            </p:cNvSpPr>
+            <p:nvPr>
+              <p:extLst>
+                <p:ext uri="{386F3935-93C4-4BCD-93E2-E3B085C9AB24}">
+                  <p16:designElem xmlns:p16="http://schemas.microsoft.com/office/powerpoint/2015/main" val="1"/>
+                </p:ext>
+              </p:extLst>
+            </p:nvPr>
+          </p:nvSpPr>
+          <p:spPr bwMode="auto">
+            <a:xfrm>
+              <a:off x="11287125" y="6049963"/>
+              <a:ext cx="879475" cy="793750"/>
+            </a:xfrm>
+            <a:custGeom>
+              <a:avLst/>
+              <a:gdLst>
+                <a:gd name="T0" fmla="*/ 0 w 185"/>
+                <a:gd name="T1" fmla="*/ 167 h 167"/>
+                <a:gd name="T2" fmla="*/ 185 w 185"/>
+                <a:gd name="T3" fmla="*/ 0 h 167"/>
+              </a:gdLst>
+              <a:ahLst/>
+              <a:cxnLst>
+                <a:cxn ang="0">
+                  <a:pos x="T0" y="T1"/>
+                </a:cxn>
+                <a:cxn ang="0">
+                  <a:pos x="T2" y="T3"/>
+                </a:cxn>
+              </a:cxnLst>
+              <a:rect l="0" t="0" r="r" b="b"/>
+              <a:pathLst>
+                <a:path w="185" h="167">
+                  <a:moveTo>
+                    <a:pt x="0" y="167"/>
+                  </a:moveTo>
+                  <a:cubicBezTo>
+                    <a:pt x="63" y="114"/>
+                    <a:pt x="125" y="58"/>
+                    <a:pt x="185" y="0"/>
+                  </a:cubicBezTo>
+                </a:path>
+              </a:pathLst>
+            </a:custGeom>
+            <a:noFill/>
+            <a:ln w="9525" cap="flat">
+              <a:solidFill>
+                <a:schemeClr val="tx1">
+                  <a:alpha val="10000"/>
+                </a:schemeClr>
+              </a:solidFill>
+              <a:prstDash val="solid"/>
+              <a:miter lim="800000"/>
+              <a:headEnd/>
+              <a:tailEnd/>
+            </a:ln>
+            <a:extLst>
+              <a:ext uri="{909E8E84-426E-40DD-AFC4-6F175D3DCCD1}">
+                <a14:hiddenFill xmlns:a14="http://schemas.microsoft.com/office/drawing/2010/main">
+                  <a:solidFill>
+                    <a:srgbClr val="FFFFFF"/>
+                  </a:solidFill>
+                </a14:hiddenFill>
+              </a:ext>
+            </a:extLst>
+          </p:spPr>
+          <p:txBody>
+            <a:bodyPr vert="horz" wrap="square" lIns="91440" tIns="45720" rIns="91440" bIns="45720" numCol="1" anchor="t" anchorCtr="0" compatLnSpc="1">
+              <a:prstTxWarp prst="textNoShape">
+                <a:avLst/>
+              </a:prstTxWarp>
+            </a:bodyPr>
+            <a:lstStyle/>
+            <a:p>
+              <a:endParaRPr lang="en-US"/>
+            </a:p>
+          </p:txBody>
+        </p:sp>
+        <p:sp>
+          <p:nvSpPr>
+            <p:cNvPr id="106" name="Freeform 20">
+              <a:extLst>
+                <a:ext uri="{FF2B5EF4-FFF2-40B4-BE49-F238E27FC236}">
+                  <a16:creationId xmlns:a16="http://schemas.microsoft.com/office/drawing/2014/main" id="{187E37E0-AAC3-4B33-AF36-334ACCBD33C8}"/>
+                </a:ext>
+                <a:ext uri="{C183D7F6-B498-43B3-948B-1728B52AA6E4}">
+                  <adec:decorative xmlns:adec="http://schemas.microsoft.com/office/drawing/2017/decorative" val="1"/>
+                </a:ext>
+              </a:extLst>
+            </p:cNvPr>
+            <p:cNvSpPr>
+              <a:spLocks/>
+            </p:cNvSpPr>
+            <p:nvPr>
+              <p:extLst>
+                <p:ext uri="{386F3935-93C4-4BCD-93E2-E3B085C9AB24}">
+                  <p16:designElem xmlns:p16="http://schemas.microsoft.com/office/powerpoint/2015/main" val="1"/>
+                </p:ext>
+              </p:extLst>
+            </p:nvPr>
+          </p:nvSpPr>
+          <p:spPr bwMode="auto">
+            <a:xfrm>
+              <a:off x="598488" y="0"/>
+              <a:ext cx="2717800" cy="6843713"/>
+            </a:xfrm>
+            <a:custGeom>
+              <a:avLst/>
+              <a:gdLst>
+                <a:gd name="T0" fmla="*/ 572 w 572"/>
+                <a:gd name="T1" fmla="*/ 0 h 1440"/>
+                <a:gd name="T2" fmla="*/ 164 w 572"/>
+                <a:gd name="T3" fmla="*/ 1440 h 1440"/>
+              </a:gdLst>
+              <a:ahLst/>
+              <a:cxnLst>
+                <a:cxn ang="0">
+                  <a:pos x="T0" y="T1"/>
+                </a:cxn>
+                <a:cxn ang="0">
+                  <a:pos x="T2" y="T3"/>
+                </a:cxn>
+              </a:cxnLst>
+              <a:rect l="0" t="0" r="r" b="b"/>
+              <a:pathLst>
+                <a:path w="572" h="1440">
+                  <a:moveTo>
+                    <a:pt x="572" y="0"/>
+                  </a:moveTo>
+                  <a:cubicBezTo>
+                    <a:pt x="213" y="320"/>
+                    <a:pt x="0" y="979"/>
+                    <a:pt x="164" y="1440"/>
+                  </a:cubicBezTo>
+                </a:path>
+              </a:pathLst>
+            </a:custGeom>
+            <a:noFill/>
+            <a:ln w="12700" cap="flat">
+              <a:solidFill>
+                <a:schemeClr val="tx1">
+                  <a:alpha val="10000"/>
+                </a:schemeClr>
+              </a:solidFill>
+              <a:prstDash val="dashDot"/>
+              <a:miter lim="800000"/>
+              <a:headEnd/>
+              <a:tailEnd/>
+            </a:ln>
+            <a:extLst>
+              <a:ext uri="{909E8E84-426E-40DD-AFC4-6F175D3DCCD1}">
+                <a14:hiddenFill xmlns:a14="http://schemas.microsoft.com/office/drawing/2010/main">
+                  <a:solidFill>
+                    <a:srgbClr val="FFFFFF"/>
+                  </a:solidFill>
+                </a14:hiddenFill>
+              </a:ext>
+            </a:extLst>
+          </p:spPr>
+          <p:txBody>
+            <a:bodyPr vert="horz" wrap="square" lIns="91440" tIns="45720" rIns="91440" bIns="45720" numCol="1" anchor="t" anchorCtr="0" compatLnSpc="1">
+              <a:prstTxWarp prst="textNoShape">
+                <a:avLst/>
+              </a:prstTxWarp>
+            </a:bodyPr>
+            <a:lstStyle/>
+            <a:p>
+              <a:endParaRPr lang="en-US"/>
+            </a:p>
+          </p:txBody>
+        </p:sp>
+        <p:sp>
+          <p:nvSpPr>
+            <p:cNvPr id="107" name="Freeform 21">
+              <a:extLst>
+                <a:ext uri="{FF2B5EF4-FFF2-40B4-BE49-F238E27FC236}">
+                  <a16:creationId xmlns:a16="http://schemas.microsoft.com/office/drawing/2014/main" id="{409758BB-8A0E-4BEB-BC0C-F410AD98CDD9}"/>
+                </a:ext>
+                <a:ext uri="{C183D7F6-B498-43B3-948B-1728B52AA6E4}">
+                  <adec:decorative xmlns:adec="http://schemas.microsoft.com/office/drawing/2017/decorative" val="1"/>
+                </a:ext>
+              </a:extLst>
+            </p:cNvPr>
+            <p:cNvSpPr>
+              <a:spLocks/>
+            </p:cNvSpPr>
+            <p:nvPr>
+              <p:extLst>
+                <p:ext uri="{386F3935-93C4-4BCD-93E2-E3B085C9AB24}">
+                  <p16:designElem xmlns:p16="http://schemas.microsoft.com/office/powerpoint/2015/main" val="1"/>
+                </p:ext>
+              </p:extLst>
+            </p:nvPr>
+          </p:nvSpPr>
+          <p:spPr bwMode="auto">
+            <a:xfrm>
+              <a:off x="261938" y="0"/>
+              <a:ext cx="2944813" cy="6843713"/>
+            </a:xfrm>
+            <a:custGeom>
+              <a:avLst/>
+              <a:gdLst>
+                <a:gd name="T0" fmla="*/ 620 w 620"/>
+                <a:gd name="T1" fmla="*/ 0 h 1440"/>
+                <a:gd name="T2" fmla="*/ 186 w 620"/>
+                <a:gd name="T3" fmla="*/ 1440 h 1440"/>
+              </a:gdLst>
+              <a:ahLst/>
+              <a:cxnLst>
+                <a:cxn ang="0">
+                  <a:pos x="T0" y="T1"/>
+                </a:cxn>
+                <a:cxn ang="0">
+                  <a:pos x="T2" y="T3"/>
+                </a:cxn>
+              </a:cxnLst>
+              <a:rect l="0" t="0" r="r" b="b"/>
+              <a:pathLst>
+                <a:path w="620" h="1440">
+                  <a:moveTo>
+                    <a:pt x="620" y="0"/>
+                  </a:moveTo>
+                  <a:cubicBezTo>
+                    <a:pt x="248" y="325"/>
+                    <a:pt x="0" y="960"/>
+                    <a:pt x="186" y="1440"/>
+                  </a:cubicBezTo>
+                </a:path>
+              </a:pathLst>
+            </a:custGeom>
+            <a:noFill/>
+            <a:ln w="9525" cap="flat">
+              <a:solidFill>
+                <a:schemeClr val="tx1">
+                  <a:alpha val="10000"/>
+                </a:schemeClr>
+              </a:solidFill>
+              <a:prstDash val="lgDash"/>
+              <a:miter lim="800000"/>
+              <a:headEnd/>
+              <a:tailEnd/>
+            </a:ln>
+            <a:extLst>
+              <a:ext uri="{909E8E84-426E-40DD-AFC4-6F175D3DCCD1}">
+                <a14:hiddenFill xmlns:a14="http://schemas.microsoft.com/office/drawing/2010/main">
+                  <a:solidFill>
+                    <a:srgbClr val="FFFFFF"/>
+                  </a:solidFill>
+                </a14:hiddenFill>
+              </a:ext>
+            </a:extLst>
+          </p:spPr>
+          <p:txBody>
+            <a:bodyPr vert="horz" wrap="square" lIns="91440" tIns="45720" rIns="91440" bIns="45720" numCol="1" anchor="t" anchorCtr="0" compatLnSpc="1">
+              <a:prstTxWarp prst="textNoShape">
+                <a:avLst/>
+              </a:prstTxWarp>
+            </a:bodyPr>
+            <a:lstStyle/>
+            <a:p>
+              <a:endParaRPr lang="en-US"/>
+            </a:p>
+          </p:txBody>
+        </p:sp>
+        <p:sp>
+          <p:nvSpPr>
+            <p:cNvPr id="108" name="Freeform 22">
+              <a:extLst>
+                <a:ext uri="{FF2B5EF4-FFF2-40B4-BE49-F238E27FC236}">
+                  <a16:creationId xmlns:a16="http://schemas.microsoft.com/office/drawing/2014/main" id="{97C4EFE2-9D25-4978-BD9A-873B49270210}"/>
+                </a:ext>
+                <a:ext uri="{C183D7F6-B498-43B3-948B-1728B52AA6E4}">
+                  <adec:decorative xmlns:adec="http://schemas.microsoft.com/office/drawing/2017/decorative" val="1"/>
+                </a:ext>
+              </a:extLst>
+            </p:cNvPr>
+            <p:cNvSpPr>
+              <a:spLocks/>
+            </p:cNvSpPr>
+            <p:nvPr>
+              <p:extLst>
+                <p:ext uri="{386F3935-93C4-4BCD-93E2-E3B085C9AB24}">
+                  <p16:designElem xmlns:p16="http://schemas.microsoft.com/office/powerpoint/2015/main" val="1"/>
+                </p:ext>
+              </p:extLst>
+            </p:nvPr>
+          </p:nvSpPr>
+          <p:spPr bwMode="auto">
+            <a:xfrm>
+              <a:off x="-417513" y="0"/>
+              <a:ext cx="2403475" cy="6843713"/>
+            </a:xfrm>
+            <a:custGeom>
+              <a:avLst/>
+              <a:gdLst>
+                <a:gd name="T0" fmla="*/ 506 w 506"/>
+                <a:gd name="T1" fmla="*/ 0 h 1440"/>
+                <a:gd name="T2" fmla="*/ 171 w 506"/>
+                <a:gd name="T3" fmla="*/ 1440 h 1440"/>
+              </a:gdLst>
+              <a:ahLst/>
+              <a:cxnLst>
+                <a:cxn ang="0">
+                  <a:pos x="T0" y="T1"/>
+                </a:cxn>
+                <a:cxn ang="0">
+                  <a:pos x="T2" y="T3"/>
+                </a:cxn>
+              </a:cxnLst>
+              <a:rect l="0" t="0" r="r" b="b"/>
+              <a:pathLst>
+                <a:path w="506" h="1440">
+                  <a:moveTo>
+                    <a:pt x="506" y="0"/>
+                  </a:moveTo>
+                  <a:cubicBezTo>
+                    <a:pt x="109" y="356"/>
+                    <a:pt x="0" y="943"/>
+                    <a:pt x="171" y="1440"/>
+                  </a:cubicBezTo>
+                </a:path>
+              </a:pathLst>
+            </a:custGeom>
+            <a:noFill/>
+            <a:ln w="9525" cap="flat">
+              <a:solidFill>
+                <a:schemeClr val="tx1">
+                  <a:alpha val="10000"/>
+                </a:schemeClr>
+              </a:solidFill>
+              <a:prstDash val="solid"/>
+              <a:miter lim="800000"/>
+              <a:headEnd/>
+              <a:tailEnd/>
+            </a:ln>
+            <a:extLst>
+              <a:ext uri="{909E8E84-426E-40DD-AFC4-6F175D3DCCD1}">
+                <a14:hiddenFill xmlns:a14="http://schemas.microsoft.com/office/drawing/2010/main">
+                  <a:solidFill>
+                    <a:srgbClr val="FFFFFF"/>
+                  </a:solidFill>
+                </a14:hiddenFill>
+              </a:ext>
+            </a:extLst>
+          </p:spPr>
+          <p:txBody>
+            <a:bodyPr vert="horz" wrap="square" lIns="91440" tIns="45720" rIns="91440" bIns="45720" numCol="1" anchor="t" anchorCtr="0" compatLnSpc="1">
+              <a:prstTxWarp prst="textNoShape">
+                <a:avLst/>
+              </a:prstTxWarp>
+            </a:bodyPr>
+            <a:lstStyle/>
+            <a:p>
+              <a:endParaRPr lang="en-US"/>
+            </a:p>
+          </p:txBody>
+        </p:sp>
+        <p:sp>
+          <p:nvSpPr>
+            <p:cNvPr id="109" name="Freeform 23">
+              <a:extLst>
+                <a:ext uri="{FF2B5EF4-FFF2-40B4-BE49-F238E27FC236}">
+                  <a16:creationId xmlns:a16="http://schemas.microsoft.com/office/drawing/2014/main" id="{9CCAF82A-A0E0-4B55-A97B-EFFAE79AF7D2}"/>
+                </a:ext>
+                <a:ext uri="{C183D7F6-B498-43B3-948B-1728B52AA6E4}">
+                  <adec:decorative xmlns:adec="http://schemas.microsoft.com/office/drawing/2017/decorative" val="1"/>
+                </a:ext>
+              </a:extLst>
+            </p:cNvPr>
+            <p:cNvSpPr>
+              <a:spLocks/>
+            </p:cNvSpPr>
+            <p:nvPr>
+              <p:extLst>
+                <p:ext uri="{386F3935-93C4-4BCD-93E2-E3B085C9AB24}">
+                  <p16:designElem xmlns:p16="http://schemas.microsoft.com/office/powerpoint/2015/main" val="1"/>
+                </p:ext>
+              </p:extLst>
+            </p:nvPr>
+          </p:nvSpPr>
+          <p:spPr bwMode="auto">
+            <a:xfrm>
+              <a:off x="14288" y="9525"/>
+              <a:ext cx="1771650" cy="3198813"/>
+            </a:xfrm>
+            <a:custGeom>
+              <a:avLst/>
+              <a:gdLst>
+                <a:gd name="T0" fmla="*/ 373 w 373"/>
+                <a:gd name="T1" fmla="*/ 0 h 673"/>
+                <a:gd name="T2" fmla="*/ 0 w 373"/>
+                <a:gd name="T3" fmla="*/ 673 h 673"/>
+              </a:gdLst>
+              <a:ahLst/>
+              <a:cxnLst>
+                <a:cxn ang="0">
+                  <a:pos x="T0" y="T1"/>
+                </a:cxn>
+                <a:cxn ang="0">
+                  <a:pos x="T2" y="T3"/>
+                </a:cxn>
+              </a:cxnLst>
+              <a:rect l="0" t="0" r="r" b="b"/>
+              <a:pathLst>
+                <a:path w="373" h="673">
+                  <a:moveTo>
+                    <a:pt x="373" y="0"/>
+                  </a:moveTo>
+                  <a:cubicBezTo>
+                    <a:pt x="175" y="183"/>
+                    <a:pt x="51" y="409"/>
+                    <a:pt x="0" y="673"/>
+                  </a:cubicBezTo>
+                </a:path>
+              </a:pathLst>
+            </a:custGeom>
+            <a:noFill/>
+            <a:ln w="9525" cap="flat">
+              <a:solidFill>
+                <a:schemeClr val="tx1">
+                  <a:alpha val="10000"/>
+                </a:schemeClr>
+              </a:solidFill>
+              <a:prstDash val="solid"/>
+              <a:miter lim="800000"/>
+              <a:headEnd/>
+              <a:tailEnd/>
+            </a:ln>
+            <a:extLst>
+              <a:ext uri="{909E8E84-426E-40DD-AFC4-6F175D3DCCD1}">
+                <a14:hiddenFill xmlns:a14="http://schemas.microsoft.com/office/drawing/2010/main">
+                  <a:solidFill>
+                    <a:srgbClr val="FFFFFF"/>
+                  </a:solidFill>
+                </a14:hiddenFill>
+              </a:ext>
+            </a:extLst>
+          </p:spPr>
+          <p:txBody>
+            <a:bodyPr vert="horz" wrap="square" lIns="91440" tIns="45720" rIns="91440" bIns="45720" numCol="1" anchor="t" anchorCtr="0" compatLnSpc="1">
+              <a:prstTxWarp prst="textNoShape">
+                <a:avLst/>
+              </a:prstTxWarp>
+            </a:bodyPr>
+            <a:lstStyle/>
+            <a:p>
+              <a:endParaRPr lang="en-US"/>
+            </a:p>
+          </p:txBody>
+        </p:sp>
+        <p:sp>
+          <p:nvSpPr>
+            <p:cNvPr id="110" name="Freeform 24">
+              <a:extLst>
+                <a:ext uri="{FF2B5EF4-FFF2-40B4-BE49-F238E27FC236}">
+                  <a16:creationId xmlns:a16="http://schemas.microsoft.com/office/drawing/2014/main" id="{4F800DD8-3954-4F73-8807-16F1CFAC1EBA}"/>
+                </a:ext>
+                <a:ext uri="{C183D7F6-B498-43B3-948B-1728B52AA6E4}">
+                  <adec:decorative xmlns:adec="http://schemas.microsoft.com/office/drawing/2017/decorative" val="1"/>
+                </a:ext>
+              </a:extLst>
+            </p:cNvPr>
+            <p:cNvSpPr>
+              <a:spLocks/>
+            </p:cNvSpPr>
+            <p:nvPr>
+              <p:extLst>
+                <p:ext uri="{386F3935-93C4-4BCD-93E2-E3B085C9AB24}">
+                  <p16:designElem xmlns:p16="http://schemas.microsoft.com/office/powerpoint/2015/main" val="1"/>
+                </p:ext>
+              </p:extLst>
+            </p:nvPr>
+          </p:nvSpPr>
+          <p:spPr bwMode="auto">
+            <a:xfrm>
+              <a:off x="4763" y="6016625"/>
+              <a:ext cx="214313" cy="827088"/>
+            </a:xfrm>
+            <a:custGeom>
+              <a:avLst/>
+              <a:gdLst>
+                <a:gd name="T0" fmla="*/ 0 w 45"/>
+                <a:gd name="T1" fmla="*/ 0 h 174"/>
+                <a:gd name="T2" fmla="*/ 45 w 45"/>
+                <a:gd name="T3" fmla="*/ 174 h 174"/>
+              </a:gdLst>
+              <a:ahLst/>
+              <a:cxnLst>
+                <a:cxn ang="0">
+                  <a:pos x="T0" y="T1"/>
+                </a:cxn>
+                <a:cxn ang="0">
+                  <a:pos x="T2" y="T3"/>
+                </a:cxn>
+              </a:cxnLst>
+              <a:rect l="0" t="0" r="r" b="b"/>
+              <a:pathLst>
+                <a:path w="45" h="174">
+                  <a:moveTo>
+                    <a:pt x="0" y="0"/>
+                  </a:moveTo>
+                  <a:cubicBezTo>
+                    <a:pt x="11" y="59"/>
+                    <a:pt x="26" y="118"/>
+                    <a:pt x="45" y="174"/>
+                  </a:cubicBezTo>
+                </a:path>
+              </a:pathLst>
+            </a:custGeom>
+            <a:noFill/>
+            <a:ln w="9525" cap="flat">
+              <a:solidFill>
+                <a:schemeClr val="tx1">
+                  <a:alpha val="10000"/>
+                </a:schemeClr>
+              </a:solidFill>
+              <a:prstDash val="solid"/>
+              <a:miter lim="800000"/>
+              <a:headEnd/>
+              <a:tailEnd/>
+            </a:ln>
+            <a:extLst>
+              <a:ext uri="{909E8E84-426E-40DD-AFC4-6F175D3DCCD1}">
+                <a14:hiddenFill xmlns:a14="http://schemas.microsoft.com/office/drawing/2010/main">
+                  <a:solidFill>
+                    <a:srgbClr val="FFFFFF"/>
+                  </a:solidFill>
+                </a14:hiddenFill>
+              </a:ext>
+            </a:extLst>
+          </p:spPr>
+          <p:txBody>
+            <a:bodyPr vert="horz" wrap="square" lIns="91440" tIns="45720" rIns="91440" bIns="45720" numCol="1" anchor="t" anchorCtr="0" compatLnSpc="1">
+              <a:prstTxWarp prst="textNoShape">
+                <a:avLst/>
+              </a:prstTxWarp>
+            </a:bodyPr>
+            <a:lstStyle/>
+            <a:p>
+              <a:endParaRPr lang="en-US"/>
+            </a:p>
+          </p:txBody>
+        </p:sp>
+        <p:sp>
+          <p:nvSpPr>
+            <p:cNvPr id="111" name="Freeform 25">
+              <a:extLst>
+                <a:ext uri="{FF2B5EF4-FFF2-40B4-BE49-F238E27FC236}">
+                  <a16:creationId xmlns:a16="http://schemas.microsoft.com/office/drawing/2014/main" id="{84E1C91A-4B06-4852-918C-6380FA986BB2}"/>
+                </a:ext>
+                <a:ext uri="{C183D7F6-B498-43B3-948B-1728B52AA6E4}">
+                  <adec:decorative xmlns:adec="http://schemas.microsoft.com/office/drawing/2017/decorative" val="1"/>
+                </a:ext>
+              </a:extLst>
+            </p:cNvPr>
+            <p:cNvSpPr>
+              <a:spLocks/>
+            </p:cNvSpPr>
+            <p:nvPr>
+              <p:extLst>
+                <p:ext uri="{386F3935-93C4-4BCD-93E2-E3B085C9AB24}">
+                  <p16:designElem xmlns:p16="http://schemas.microsoft.com/office/powerpoint/2015/main" val="1"/>
+                </p:ext>
+              </p:extLst>
+            </p:nvPr>
+          </p:nvSpPr>
+          <p:spPr bwMode="auto">
+            <a:xfrm>
+              <a:off x="14288" y="0"/>
+              <a:ext cx="1562100" cy="2228850"/>
+            </a:xfrm>
+            <a:custGeom>
+              <a:avLst/>
+              <a:gdLst>
+                <a:gd name="T0" fmla="*/ 329 w 329"/>
+                <a:gd name="T1" fmla="*/ 0 h 469"/>
+                <a:gd name="T2" fmla="*/ 0 w 329"/>
+                <a:gd name="T3" fmla="*/ 469 h 469"/>
+              </a:gdLst>
+              <a:ahLst/>
+              <a:cxnLst>
+                <a:cxn ang="0">
+                  <a:pos x="T0" y="T1"/>
+                </a:cxn>
+                <a:cxn ang="0">
+                  <a:pos x="T2" y="T3"/>
+                </a:cxn>
+              </a:cxnLst>
+              <a:rect l="0" t="0" r="r" b="b"/>
+              <a:pathLst>
+                <a:path w="329" h="469">
+                  <a:moveTo>
+                    <a:pt x="329" y="0"/>
+                  </a:moveTo>
+                  <a:cubicBezTo>
+                    <a:pt x="189" y="133"/>
+                    <a:pt x="69" y="288"/>
+                    <a:pt x="0" y="469"/>
+                  </a:cubicBezTo>
+                </a:path>
+              </a:pathLst>
+            </a:custGeom>
+            <a:noFill/>
+            <a:ln w="9525" cap="flat">
+              <a:solidFill>
+                <a:schemeClr val="tx1">
+                  <a:alpha val="10000"/>
+                </a:schemeClr>
+              </a:solidFill>
+              <a:prstDash val="solid"/>
+              <a:miter lim="800000"/>
+              <a:headEnd/>
+              <a:tailEnd/>
+            </a:ln>
+            <a:extLst>
+              <a:ext uri="{909E8E84-426E-40DD-AFC4-6F175D3DCCD1}">
+                <a14:hiddenFill xmlns:a14="http://schemas.microsoft.com/office/drawing/2010/main">
+                  <a:solidFill>
+                    <a:srgbClr val="FFFFFF"/>
+                  </a:solidFill>
+                </a14:hiddenFill>
+              </a:ext>
+            </a:extLst>
+          </p:spPr>
+          <p:txBody>
+            <a:bodyPr vert="horz" wrap="square" lIns="91440" tIns="45720" rIns="91440" bIns="45720" numCol="1" anchor="t" anchorCtr="0" compatLnSpc="1">
+              <a:prstTxWarp prst="textNoShape">
+                <a:avLst/>
+              </a:prstTxWarp>
+            </a:bodyPr>
+            <a:lstStyle/>
+            <a:p>
+              <a:endParaRPr lang="en-US"/>
+            </a:p>
+          </p:txBody>
+        </p:sp>
+      </p:grpSp>
+      <p:sp>
+        <p:nvSpPr>
+          <p:cNvPr id="2" name="Title 1">
+            <a:extLst>
+              <a:ext uri="{FF2B5EF4-FFF2-40B4-BE49-F238E27FC236}">
+                <a16:creationId xmlns:a16="http://schemas.microsoft.com/office/drawing/2014/main" id="{52D95D0F-36E6-D248-9046-6BA200FEEF66}"/>
+              </a:ext>
+            </a:extLst>
+          </p:cNvPr>
+          <p:cNvSpPr>
+            <a:spLocks noGrp="1"/>
+          </p:cNvSpPr>
+          <p:nvPr>
+            <p:ph type="title"/>
+          </p:nvPr>
+        </p:nvSpPr>
+        <p:spPr>
+          <a:xfrm>
+            <a:off x="828916" y="488694"/>
+            <a:ext cx="10488547" cy="1436546"/>
+          </a:xfrm>
+        </p:spPr>
+        <p:txBody>
+          <a:bodyPr>
+            <a:normAutofit/>
+          </a:bodyPr>
+          <a:lstStyle/>
+          <a:p>
+            <a:r>
+              <a:rPr lang="en-US" dirty="0">
+                <a:solidFill>
+                  <a:schemeClr val="tx2"/>
+                </a:solidFill>
+              </a:rPr>
+              <a:t>ROC Curve (Julia)</a:t>
+            </a:r>
+          </a:p>
+        </p:txBody>
+      </p:sp>
+      <p:sp>
+        <p:nvSpPr>
+          <p:cNvPr id="112" name="Rectangle 63">
+            <a:extLst>
+              <a:ext uri="{FF2B5EF4-FFF2-40B4-BE49-F238E27FC236}">
+                <a16:creationId xmlns:a16="http://schemas.microsoft.com/office/drawing/2014/main" id="{E972DE0D-2E53-4159-ABD3-C601524262C2}"/>
+              </a:ext>
+              <a:ext uri="{C183D7F6-B498-43B3-948B-1728B52AA6E4}">
+                <adec:decorative xmlns:adec="http://schemas.microsoft.com/office/drawing/2017/decorative" val="1"/>
+              </a:ext>
+            </a:extLst>
+          </p:cNvPr>
+          <p:cNvSpPr>
+            <a:spLocks noGrp="1" noRot="1" noChangeAspect="1" noMove="1" noResize="1" noEditPoints="1" noAdjustHandles="1" noChangeArrowheads="1" noChangeShapeType="1" noTextEdit="1"/>
+          </p:cNvSpPr>
+          <p:nvPr>
+            <p:extLst>
+              <p:ext uri="{386F3935-93C4-4BCD-93E2-E3B085C9AB24}">
+                <p16:designElem xmlns:p16="http://schemas.microsoft.com/office/powerpoint/2015/main" val="1"/>
+              </p:ext>
+            </p:extLst>
+          </p:nvPr>
+        </p:nvSpPr>
+        <p:spPr>
+          <a:xfrm>
+            <a:off x="937030" y="2250281"/>
+            <a:ext cx="4959318" cy="3678237"/>
+          </a:xfrm>
+          <a:prstGeom prst="rect">
+            <a:avLst/>
+          </a:prstGeom>
+          <a:solidFill>
+            <a:schemeClr val="bg1"/>
+          </a:solidFill>
+          <a:ln w="19050">
+            <a:solidFill>
+              <a:srgbClr val="8CDDFE"/>
+            </a:solidFill>
+            <a:miter lim="800000"/>
+          </a:ln>
+        </p:spPr>
+        <p:style>
+          <a:lnRef idx="2">
+            <a:schemeClr val="accent1">
+              <a:shade val="50000"/>
+            </a:schemeClr>
+          </a:lnRef>
+          <a:fillRef idx="1">
+            <a:schemeClr val="accent1"/>
+          </a:fillRef>
+          <a:effectRef idx="0">
+            <a:schemeClr val="accent1"/>
+          </a:effectRef>
+          <a:fontRef idx="minor">
+            <a:schemeClr val="lt1"/>
+          </a:fontRef>
+        </p:style>
+        <p:txBody>
+          <a:bodyPr rtlCol="0" anchor="ctr"/>
+          <a:lstStyle/>
+          <a:p>
+            <a:pPr algn="ctr"/>
+            <a:endParaRPr lang="en-US"/>
+          </a:p>
+        </p:txBody>
+      </p:sp>
+      <p:pic>
+        <p:nvPicPr>
+          <p:cNvPr id="6" name="Picture 5" descr="Chart, line chart&#10;&#10;Description automatically generated">
+            <a:extLst>
+              <a:ext uri="{FF2B5EF4-FFF2-40B4-BE49-F238E27FC236}">
+                <a16:creationId xmlns:a16="http://schemas.microsoft.com/office/drawing/2014/main" id="{84892727-E2BE-3B48-9FF0-8F840D992DB0}"/>
+              </a:ext>
+            </a:extLst>
+          </p:cNvPr>
+          <p:cNvPicPr>
+            <a:picLocks noChangeAspect="1"/>
+          </p:cNvPicPr>
+          <p:nvPr/>
+        </p:nvPicPr>
+        <p:blipFill>
+          <a:blip r:embed="rId2"/>
+          <a:stretch>
+            <a:fillRect/>
+          </a:stretch>
+        </p:blipFill>
+        <p:spPr>
+          <a:xfrm>
+            <a:off x="1065545" y="2474839"/>
+            <a:ext cx="4726912" cy="3143396"/>
+          </a:xfrm>
+          <a:prstGeom prst="rect">
+            <a:avLst/>
+          </a:prstGeom>
+          <a:ln w="12700">
+            <a:noFill/>
+          </a:ln>
+        </p:spPr>
+      </p:pic>
+      <p:sp>
+        <p:nvSpPr>
+          <p:cNvPr id="3" name="Content Placeholder 2">
+            <a:extLst>
+              <a:ext uri="{FF2B5EF4-FFF2-40B4-BE49-F238E27FC236}">
+                <a16:creationId xmlns:a16="http://schemas.microsoft.com/office/drawing/2014/main" id="{42437789-16AA-DE48-86F2-28CE4174B73F}"/>
+              </a:ext>
+            </a:extLst>
+          </p:cNvPr>
+          <p:cNvSpPr>
+            <a:spLocks noGrp="1"/>
+          </p:cNvSpPr>
+          <p:nvPr>
+            <p:ph idx="1"/>
+          </p:nvPr>
+        </p:nvSpPr>
+        <p:spPr>
+          <a:xfrm>
+            <a:off x="6299472" y="2082390"/>
+            <a:ext cx="5028928" cy="4003279"/>
+          </a:xfrm>
+        </p:spPr>
+        <p:txBody>
+          <a:bodyPr>
+            <a:normAutofit fontScale="92500" lnSpcReduction="20000"/>
+          </a:bodyPr>
+          <a:lstStyle/>
+          <a:p>
+            <a:pPr>
+              <a:buClr>
+                <a:srgbClr val="8CDDFE"/>
+              </a:buClr>
+            </a:pPr>
+            <a:r>
+              <a:rPr lang="en-CA" dirty="0"/>
+              <a:t>Receiver Operating Characteristics curve is the evaluation metric used to evaluate the classification model based on its predictive power to predict class one’s accuracy and class zero’s accuracy.</a:t>
+            </a:r>
+          </a:p>
+          <a:p>
+            <a:r>
+              <a:rPr lang="en-CA" dirty="0"/>
+              <a:t>Ideally the curve should be close to the y-axis line and top line of the x-axis, but it’s far from it. That means it is not a good model.</a:t>
+            </a:r>
+          </a:p>
+          <a:p>
+            <a:r>
+              <a:rPr lang="en-CA" dirty="0"/>
+              <a:t>This is because of the high-class imbalance. i.e. while training the data, most of the data points were having class 0.</a:t>
+            </a:r>
+          </a:p>
+          <a:p>
+            <a:r>
+              <a:rPr lang="en-CA" dirty="0"/>
+              <a:t>Unfortunately,  we did not find a way to fix this issue.</a:t>
+            </a:r>
+          </a:p>
+          <a:p>
+            <a:pPr>
+              <a:buClr>
+                <a:srgbClr val="8CDDFE"/>
+              </a:buClr>
+            </a:pPr>
+            <a:endParaRPr lang="en-US" dirty="0"/>
+          </a:p>
+        </p:txBody>
+      </p:sp>
+      <p:sp>
+        <p:nvSpPr>
+          <p:cNvPr id="5" name="TextBox 4">
+            <a:extLst>
+              <a:ext uri="{FF2B5EF4-FFF2-40B4-BE49-F238E27FC236}">
+                <a16:creationId xmlns:a16="http://schemas.microsoft.com/office/drawing/2014/main" id="{05C8206B-2BC3-804A-BE7B-88026C36E799}"/>
+              </a:ext>
+            </a:extLst>
+          </p:cNvPr>
+          <p:cNvSpPr txBox="1"/>
+          <p:nvPr/>
+        </p:nvSpPr>
+        <p:spPr>
+          <a:xfrm>
+            <a:off x="951310" y="6262172"/>
+            <a:ext cx="4510882" cy="369332"/>
+          </a:xfrm>
+          <a:prstGeom prst="rect">
+            <a:avLst/>
+          </a:prstGeom>
+          <a:noFill/>
+        </p:spPr>
+        <p:txBody>
+          <a:bodyPr wrap="square" rtlCol="0">
+            <a:spAutoFit/>
+          </a:bodyPr>
+          <a:lstStyle/>
+          <a:p>
+            <a:pPr>
+              <a:spcAft>
+                <a:spcPts val="600"/>
+              </a:spcAft>
+            </a:pPr>
+            <a:r>
+              <a:rPr lang="en-US" dirty="0"/>
+              <a:t>Reference: </a:t>
+            </a:r>
+            <a:r>
+              <a:rPr lang="en-US" dirty="0">
+                <a:hlinkClick r:id="rId3"/>
+              </a:rPr>
+              <a:t>Logistic Regression in Julia</a:t>
+            </a:r>
+            <a:endParaRPr lang="en-US" dirty="0"/>
+          </a:p>
+        </p:txBody>
+      </p:sp>
+    </p:spTree>
+    <p:extLst>
+      <p:ext uri="{BB962C8B-B14F-4D97-AF65-F5344CB8AC3E}">
+        <p14:creationId xmlns:p14="http://schemas.microsoft.com/office/powerpoint/2010/main" val="566676690"/>
+      </p:ext>
+    </p:extLst>
+  </p:cSld>
+  <p:clrMapOvr>
+    <a:masterClrMapping/>
+  </p:clrMapOvr>
+</p:sld>
+</file>
+
+<file path=ppt/slides/slide5.xml><?xml version="1.0" encoding="utf-8"?>
 <p:sld xmlns:a="http://schemas.openxmlformats.org/drawingml/2006/main" xmlns:r="http://schemas.openxmlformats.org/officeDocument/2006/relationships" xmlns:p="http://schemas.openxmlformats.org/presentationml/2006/main">
   <p:cSld>
     <p:spTree>
@@ -16355,7 +18706,7 @@
 </p:sld>
 </file>
 
-<file path=ppt/slides/slide5.xml><?xml version="1.0" encoding="utf-8"?>
+<file path=ppt/slides/slide6.xml><?xml version="1.0" encoding="utf-8"?>
 <p:sld xmlns:a="http://schemas.openxmlformats.org/drawingml/2006/main" xmlns:r="http://schemas.openxmlformats.org/officeDocument/2006/relationships" xmlns:p="http://schemas.openxmlformats.org/presentationml/2006/main">
   <p:cSld>
     <p:spTree>
@@ -16514,7 +18865,7 @@
 </p:sld>
 </file>
 
-<file path=ppt/slides/slide6.xml><?xml version="1.0" encoding="utf-8"?>
+<file path=ppt/slides/slide7.xml><?xml version="1.0" encoding="utf-8"?>
 <p:sld xmlns:a="http://schemas.openxmlformats.org/drawingml/2006/main" xmlns:r="http://schemas.openxmlformats.org/officeDocument/2006/relationships" xmlns:p="http://schemas.openxmlformats.org/presentationml/2006/main">
   <p:cSld>
     <p:spTree>
@@ -16597,7 +18948,7 @@
 </p:sld>
 </file>
 
-<file path=ppt/slides/slide7.xml><?xml version="1.0" encoding="utf-8"?>
+<file path=ppt/slides/slide8.xml><?xml version="1.0" encoding="utf-8"?>
 <p:sld xmlns:a="http://schemas.openxmlformats.org/drawingml/2006/main" xmlns:r="http://schemas.openxmlformats.org/officeDocument/2006/relationships" xmlns:p="http://schemas.openxmlformats.org/presentationml/2006/main">
   <p:cSld>
     <p:spTree>
@@ -16687,7 +19038,7 @@
 </p:sld>
 </file>
 
-<file path=ppt/slides/slide8.xml><?xml version="1.0" encoding="utf-8"?>
+<file path=ppt/slides/slide9.xml><?xml version="1.0" encoding="utf-8"?>
 <p:sld xmlns:a="http://schemas.openxmlformats.org/drawingml/2006/main" xmlns:r="http://schemas.openxmlformats.org/officeDocument/2006/relationships" xmlns:p="http://schemas.openxmlformats.org/presentationml/2006/main">
   <p:cSld>
     <p:spTree>

</xml_diff>